<commit_message>
update slide and add gha
</commit_message>
<xml_diff>
--- a/slides/Penny Web Hosting in AWS.pptx
+++ b/slides/Penny Web Hosting in AWS.pptx
@@ -8,16 +8,17 @@
     <p:sldId id="256" r:id="rId2"/>
     <p:sldId id="257" r:id="rId3"/>
     <p:sldId id="258" r:id="rId4"/>
-    <p:sldId id="264" r:id="rId5"/>
-    <p:sldId id="266" r:id="rId6"/>
-    <p:sldId id="265" r:id="rId7"/>
-    <p:sldId id="259" r:id="rId8"/>
-    <p:sldId id="260" r:id="rId9"/>
-    <p:sldId id="263" r:id="rId10"/>
-    <p:sldId id="267" r:id="rId11"/>
-    <p:sldId id="261" r:id="rId12"/>
-    <p:sldId id="269" r:id="rId13"/>
-    <p:sldId id="268" r:id="rId14"/>
+    <p:sldId id="266" r:id="rId5"/>
+    <p:sldId id="265" r:id="rId6"/>
+    <p:sldId id="259" r:id="rId7"/>
+    <p:sldId id="263" r:id="rId8"/>
+    <p:sldId id="267" r:id="rId9"/>
+    <p:sldId id="261" r:id="rId10"/>
+    <p:sldId id="260" r:id="rId11"/>
+    <p:sldId id="269" r:id="rId12"/>
+    <p:sldId id="268" r:id="rId13"/>
+    <p:sldId id="264" r:id="rId14"/>
+    <p:sldId id="270" r:id="rId15"/>
   </p:sldIdLst>
   <p:sldSz cx="12192000" cy="6858000"/>
   <p:notesSz cx="6858000" cy="9144000"/>
@@ -869,7 +870,7 @@
           <a:p>
             <a:fld id="{AFEE6A1C-6F2E-4B8B-87DB-07BD8BC7DBF7}" type="datetimeFigureOut">
               <a:rPr lang="en-US" smtClean="0"/>
-              <a:t>9/16/2024</a:t>
+              <a:t>10/5/2024</a:t>
             </a:fld>
             <a:endParaRPr lang="en-US"/>
           </a:p>
@@ -1120,7 +1121,7 @@
           <a:p>
             <a:fld id="{AFEE6A1C-6F2E-4B8B-87DB-07BD8BC7DBF7}" type="datetimeFigureOut">
               <a:rPr lang="en-US" smtClean="0"/>
-              <a:t>9/16/2024</a:t>
+              <a:t>10/5/2024</a:t>
             </a:fld>
             <a:endParaRPr lang="en-US"/>
           </a:p>
@@ -1434,7 +1435,7 @@
           <a:p>
             <a:fld id="{AFEE6A1C-6F2E-4B8B-87DB-07BD8BC7DBF7}" type="datetimeFigureOut">
               <a:rPr lang="en-US" smtClean="0"/>
-              <a:t>9/16/2024</a:t>
+              <a:t>10/5/2024</a:t>
             </a:fld>
             <a:endParaRPr lang="en-US"/>
           </a:p>
@@ -1767,7 +1768,7 @@
           <a:p>
             <a:fld id="{AFEE6A1C-6F2E-4B8B-87DB-07BD8BC7DBF7}" type="datetimeFigureOut">
               <a:rPr lang="en-US" smtClean="0"/>
-              <a:t>9/16/2024</a:t>
+              <a:t>10/5/2024</a:t>
             </a:fld>
             <a:endParaRPr lang="en-US"/>
           </a:p>
@@ -2081,7 +2082,7 @@
           <a:p>
             <a:fld id="{AFEE6A1C-6F2E-4B8B-87DB-07BD8BC7DBF7}" type="datetimeFigureOut">
               <a:rPr lang="en-US" smtClean="0"/>
-              <a:t>9/16/2024</a:t>
+              <a:t>10/5/2024</a:t>
             </a:fld>
             <a:endParaRPr lang="en-US"/>
           </a:p>
@@ -2474,7 +2475,7 @@
           <a:p>
             <a:fld id="{AFEE6A1C-6F2E-4B8B-87DB-07BD8BC7DBF7}" type="datetimeFigureOut">
               <a:rPr lang="en-US" smtClean="0"/>
-              <a:t>9/16/2024</a:t>
+              <a:t>10/5/2024</a:t>
             </a:fld>
             <a:endParaRPr lang="en-US"/>
           </a:p>
@@ -2644,7 +2645,7 @@
           <a:p>
             <a:fld id="{AFEE6A1C-6F2E-4B8B-87DB-07BD8BC7DBF7}" type="datetimeFigureOut">
               <a:rPr lang="en-US" smtClean="0"/>
-              <a:t>9/16/2024</a:t>
+              <a:t>10/5/2024</a:t>
             </a:fld>
             <a:endParaRPr lang="en-US"/>
           </a:p>
@@ -2824,7 +2825,7 @@
           <a:p>
             <a:fld id="{AFEE6A1C-6F2E-4B8B-87DB-07BD8BC7DBF7}" type="datetimeFigureOut">
               <a:rPr lang="en-US" smtClean="0"/>
-              <a:t>9/16/2024</a:t>
+              <a:t>10/5/2024</a:t>
             </a:fld>
             <a:endParaRPr lang="en-US"/>
           </a:p>
@@ -2994,7 +2995,7 @@
           <a:p>
             <a:fld id="{AFEE6A1C-6F2E-4B8B-87DB-07BD8BC7DBF7}" type="datetimeFigureOut">
               <a:rPr lang="en-US" smtClean="0"/>
-              <a:t>9/16/2024</a:t>
+              <a:t>10/5/2024</a:t>
             </a:fld>
             <a:endParaRPr lang="en-US"/>
           </a:p>
@@ -3241,7 +3242,7 @@
           <a:p>
             <a:fld id="{AFEE6A1C-6F2E-4B8B-87DB-07BD8BC7DBF7}" type="datetimeFigureOut">
               <a:rPr lang="en-US" smtClean="0"/>
-              <a:t>9/16/2024</a:t>
+              <a:t>10/5/2024</a:t>
             </a:fld>
             <a:endParaRPr lang="en-US"/>
           </a:p>
@@ -3473,7 +3474,7 @@
           <a:p>
             <a:fld id="{AFEE6A1C-6F2E-4B8B-87DB-07BD8BC7DBF7}" type="datetimeFigureOut">
               <a:rPr lang="en-US" smtClean="0"/>
-              <a:t>9/16/2024</a:t>
+              <a:t>10/5/2024</a:t>
             </a:fld>
             <a:endParaRPr lang="en-US"/>
           </a:p>
@@ -3847,7 +3848,7 @@
           <a:p>
             <a:fld id="{AFEE6A1C-6F2E-4B8B-87DB-07BD8BC7DBF7}" type="datetimeFigureOut">
               <a:rPr lang="en-US" smtClean="0"/>
-              <a:t>9/16/2024</a:t>
+              <a:t>10/5/2024</a:t>
             </a:fld>
             <a:endParaRPr lang="en-US"/>
           </a:p>
@@ -3970,7 +3971,7 @@
           <a:p>
             <a:fld id="{AFEE6A1C-6F2E-4B8B-87DB-07BD8BC7DBF7}" type="datetimeFigureOut">
               <a:rPr lang="en-US" smtClean="0"/>
-              <a:t>9/16/2024</a:t>
+              <a:t>10/5/2024</a:t>
             </a:fld>
             <a:endParaRPr lang="en-US"/>
           </a:p>
@@ -4065,7 +4066,7 @@
           <a:p>
             <a:fld id="{AFEE6A1C-6F2E-4B8B-87DB-07BD8BC7DBF7}" type="datetimeFigureOut">
               <a:rPr lang="en-US" smtClean="0"/>
-              <a:t>9/16/2024</a:t>
+              <a:t>10/5/2024</a:t>
             </a:fld>
             <a:endParaRPr lang="en-US"/>
           </a:p>
@@ -4320,7 +4321,7 @@
           <a:p>
             <a:fld id="{AFEE6A1C-6F2E-4B8B-87DB-07BD8BC7DBF7}" type="datetimeFigureOut">
               <a:rPr lang="en-US" smtClean="0"/>
-              <a:t>9/16/2024</a:t>
+              <a:t>10/5/2024</a:t>
             </a:fld>
             <a:endParaRPr lang="en-US"/>
           </a:p>
@@ -4625,7 +4626,7 @@
           <a:p>
             <a:fld id="{AFEE6A1C-6F2E-4B8B-87DB-07BD8BC7DBF7}" type="datetimeFigureOut">
               <a:rPr lang="en-US" smtClean="0"/>
-              <a:t>9/16/2024</a:t>
+              <a:t>10/5/2024</a:t>
             </a:fld>
             <a:endParaRPr lang="en-US"/>
           </a:p>
@@ -5327,7 +5328,7 @@
           <a:p>
             <a:fld id="{AFEE6A1C-6F2E-4B8B-87DB-07BD8BC7DBF7}" type="datetimeFigureOut">
               <a:rPr lang="en-US" smtClean="0"/>
-              <a:t>9/16/2024</a:t>
+              <a:t>10/5/2024</a:t>
             </a:fld>
             <a:endParaRPr lang="en-US"/>
           </a:p>
@@ -5953,7 +5954,7 @@
           <p:cNvPr id="2" name="Title 1">
             <a:extLst>
               <a:ext uri="{FF2B5EF4-FFF2-40B4-BE49-F238E27FC236}">
-                <a16:creationId xmlns:a16="http://schemas.microsoft.com/office/drawing/2014/main" id="{0776A220-F5A3-FBF4-D56D-DDC372C41F8E}"/>
+                <a16:creationId xmlns:a16="http://schemas.microsoft.com/office/drawing/2014/main" id="{D945F10E-853E-CFBA-437C-74F9EB9B3C1A}"/>
               </a:ext>
             </a:extLst>
           </p:cNvPr>
@@ -5971,17 +5972,17 @@
           <a:p>
             <a:r>
               <a:rPr lang="en-US" dirty="0"/>
-              <a:t>Backup Slides</a:t>
-            </a:r>
-          </a:p>
-        </p:txBody>
-      </p:sp>
-      <p:sp>
-        <p:nvSpPr>
-          <p:cNvPr id="3" name="Text Placeholder 2">
+              <a:t>Cost</a:t>
+            </a:r>
+          </a:p>
+        </p:txBody>
+      </p:sp>
+      <p:sp>
+        <p:nvSpPr>
+          <p:cNvPr id="3" name="Content Placeholder 2">
             <a:extLst>
               <a:ext uri="{FF2B5EF4-FFF2-40B4-BE49-F238E27FC236}">
-                <a16:creationId xmlns:a16="http://schemas.microsoft.com/office/drawing/2014/main" id="{B8AD4061-DC68-FAF9-6654-F1FF033B6DCD}"/>
+                <a16:creationId xmlns:a16="http://schemas.microsoft.com/office/drawing/2014/main" id="{770135FC-86B9-D66B-5DC7-089369610D58}"/>
               </a:ext>
             </a:extLst>
           </p:cNvPr>
@@ -5989,22 +5990,589 @@
             <a:spLocks noGrp="1"/>
           </p:cNvSpPr>
           <p:nvPr>
-            <p:ph type="body" idx="1"/>
-          </p:nvPr>
-        </p:nvSpPr>
-        <p:spPr/>
-        <p:txBody>
-          <a:bodyPr/>
-          <a:lstStyle/>
-          <a:p>
-            <a:endParaRPr lang="en-US"/>
+            <p:ph idx="1"/>
+          </p:nvPr>
+        </p:nvSpPr>
+        <p:spPr>
+          <a:xfrm>
+            <a:off x="838200" y="1825624"/>
+            <a:ext cx="5321680" cy="4351337"/>
+          </a:xfrm>
+        </p:spPr>
+        <p:txBody>
+          <a:bodyPr>
+            <a:normAutofit/>
+          </a:bodyPr>
+          <a:lstStyle/>
+          <a:p>
+            <a:r>
+              <a:rPr lang="en-US" dirty="0"/>
+              <a:t>CloudFront</a:t>
+            </a:r>
+          </a:p>
+          <a:p>
+            <a:pPr lvl="1"/>
+            <a:r>
+              <a:rPr lang="en-US" b="0" i="0" dirty="0">
+                <a:solidFill>
+                  <a:srgbClr val="333333"/>
+                </a:solidFill>
+                <a:effectLst/>
+                <a:latin typeface="AmazonEmber"/>
+              </a:rPr>
+              <a:t>Free tier:</a:t>
+            </a:r>
+          </a:p>
+          <a:p>
+            <a:pPr lvl="2"/>
+            <a:r>
+              <a:rPr lang="en-US" b="0" i="0" dirty="0">
+                <a:solidFill>
+                  <a:srgbClr val="333333"/>
+                </a:solidFill>
+                <a:effectLst/>
+                <a:latin typeface="AmazonEmber"/>
+              </a:rPr>
+              <a:t>1 TB of data transfer out to the internet per month</a:t>
+            </a:r>
+          </a:p>
+          <a:p>
+            <a:pPr lvl="2"/>
+            <a:r>
+              <a:rPr lang="en-US" b="0" i="0" dirty="0">
+                <a:solidFill>
+                  <a:srgbClr val="333333"/>
+                </a:solidFill>
+                <a:effectLst/>
+                <a:latin typeface="AmazonEmber"/>
+              </a:rPr>
+              <a:t>10,000,000 HTTP or HTTPS Requests per month</a:t>
+            </a:r>
+          </a:p>
+          <a:p>
+            <a:pPr lvl="1"/>
+            <a:r>
+              <a:rPr lang="en-US" b="0" i="0" dirty="0">
+                <a:solidFill>
+                  <a:srgbClr val="333333"/>
+                </a:solidFill>
+                <a:effectLst/>
+                <a:latin typeface="AmazonEmber"/>
+              </a:rPr>
+              <a:t>Paid tier:</a:t>
+            </a:r>
+          </a:p>
+          <a:p>
+            <a:pPr lvl="2"/>
+            <a:r>
+              <a:rPr lang="en-US" b="0" i="0" dirty="0">
+                <a:solidFill>
+                  <a:srgbClr val="333333"/>
+                </a:solidFill>
+                <a:effectLst/>
+                <a:latin typeface="AmazonEmber"/>
+              </a:rPr>
+              <a:t>First 10TB: $0.085</a:t>
+            </a:r>
+          </a:p>
+          <a:p>
+            <a:pPr lvl="2"/>
+            <a:r>
+              <a:rPr lang="en-US" dirty="0">
+                <a:solidFill>
+                  <a:srgbClr val="333333"/>
+                </a:solidFill>
+                <a:latin typeface="AmazonEmber"/>
+              </a:rPr>
+              <a:t>HTTP Requests: </a:t>
+            </a:r>
+            <a:r>
+              <a:rPr lang="en-US" b="0" i="0" dirty="0">
+                <a:solidFill>
+                  <a:srgbClr val="333333"/>
+                </a:solidFill>
+                <a:effectLst/>
+                <a:latin typeface="AmazonEmber"/>
+              </a:rPr>
+              <a:t>$0.0075</a:t>
+            </a:r>
+            <a:r>
+              <a:rPr lang="en-US" dirty="0">
+                <a:solidFill>
+                  <a:srgbClr val="333333"/>
+                </a:solidFill>
+                <a:latin typeface="AmazonEmber"/>
+              </a:rPr>
+              <a:t> per 10,000 requests</a:t>
+            </a:r>
+          </a:p>
+          <a:p>
+            <a:pPr lvl="2"/>
+            <a:r>
+              <a:rPr lang="en-US" b="0" i="0" dirty="0">
+                <a:solidFill>
+                  <a:srgbClr val="333333"/>
+                </a:solidFill>
+                <a:effectLst/>
+                <a:latin typeface="AmazonEmber"/>
+              </a:rPr>
+              <a:t>HTTPS Requests: $0.0100 per 10,000 requests</a:t>
+            </a:r>
+          </a:p>
+          <a:p>
+            <a:pPr>
+              <a:lnSpc>
+                <a:spcPct val="80000"/>
+              </a:lnSpc>
+            </a:pPr>
+            <a:r>
+              <a:rPr lang="en-US" dirty="0"/>
+              <a:t>ACM (SSL Certificate)</a:t>
+            </a:r>
+          </a:p>
+          <a:p>
+            <a:pPr lvl="2"/>
+            <a:r>
+              <a:rPr lang="en-US" sz="2100" dirty="0">
+                <a:solidFill>
+                  <a:srgbClr val="333333"/>
+                </a:solidFill>
+                <a:latin typeface="AmazonEmber"/>
+              </a:rPr>
+              <a:t>Public SSL/TLS certificates provisioned through AWS Certificate Manager (ACM) are free</a:t>
+            </a:r>
+          </a:p>
+          <a:p>
+            <a:endParaRPr lang="en-US" b="0" i="0" dirty="0">
+              <a:solidFill>
+                <a:srgbClr val="333333"/>
+              </a:solidFill>
+              <a:effectLst/>
+              <a:latin typeface="AmazonEmber"/>
+            </a:endParaRPr>
+          </a:p>
+          <a:p>
+            <a:pPr lvl="1"/>
+            <a:endParaRPr lang="en-US" dirty="0"/>
+          </a:p>
+          <a:p>
+            <a:endParaRPr lang="en-US" dirty="0"/>
+          </a:p>
+        </p:txBody>
+      </p:sp>
+      <p:sp>
+        <p:nvSpPr>
+          <p:cNvPr id="5" name="Content Placeholder 2">
+            <a:extLst>
+              <a:ext uri="{FF2B5EF4-FFF2-40B4-BE49-F238E27FC236}">
+                <a16:creationId xmlns:a16="http://schemas.microsoft.com/office/drawing/2014/main" id="{55301F2B-3D69-4CDE-236D-34E32CA2217C}"/>
+              </a:ext>
+            </a:extLst>
+          </p:cNvPr>
+          <p:cNvSpPr txBox="1">
+            <a:spLocks/>
+          </p:cNvSpPr>
+          <p:nvPr/>
+        </p:nvSpPr>
+        <p:spPr>
+          <a:xfrm>
+            <a:off x="6096000" y="1825625"/>
+            <a:ext cx="5321680" cy="4351336"/>
+          </a:xfrm>
+          <a:prstGeom prst="rect">
+            <a:avLst/>
+          </a:prstGeom>
+        </p:spPr>
+        <p:txBody>
+          <a:bodyPr vert="horz" lIns="91440" tIns="45720" rIns="91440" bIns="45720" rtlCol="0">
+            <a:normAutofit fontScale="92500" lnSpcReduction="20000"/>
+          </a:bodyPr>
+          <a:lstStyle>
+            <a:lvl1pPr marL="228600" indent="-228600" algn="l" defTabSz="914400" rtl="0" eaLnBrk="1" latinLnBrk="0" hangingPunct="1">
+              <a:lnSpc>
+                <a:spcPct val="90000"/>
+              </a:lnSpc>
+              <a:spcBef>
+                <a:spcPts val="1000"/>
+              </a:spcBef>
+              <a:buFont typeface="Arial" panose="020B0604020202020204" pitchFamily="34" charset="0"/>
+              <a:buChar char="•"/>
+              <a:defRPr sz="2800" kern="1200">
+                <a:solidFill>
+                  <a:schemeClr val="tx1"/>
+                </a:solidFill>
+                <a:latin typeface="+mn-lt"/>
+                <a:ea typeface="+mn-ea"/>
+                <a:cs typeface="+mn-cs"/>
+              </a:defRPr>
+            </a:lvl1pPr>
+            <a:lvl2pPr marL="685800" indent="-228600" algn="l" defTabSz="914400" rtl="0" eaLnBrk="1" latinLnBrk="0" hangingPunct="1">
+              <a:lnSpc>
+                <a:spcPct val="90000"/>
+              </a:lnSpc>
+              <a:spcBef>
+                <a:spcPts val="500"/>
+              </a:spcBef>
+              <a:buFont typeface="Arial" panose="020B0604020202020204" pitchFamily="34" charset="0"/>
+              <a:buChar char="•"/>
+              <a:defRPr sz="2400" kern="1200">
+                <a:solidFill>
+                  <a:schemeClr val="tx1"/>
+                </a:solidFill>
+                <a:latin typeface="+mn-lt"/>
+                <a:ea typeface="+mn-ea"/>
+                <a:cs typeface="+mn-cs"/>
+              </a:defRPr>
+            </a:lvl2pPr>
+            <a:lvl3pPr marL="1143000" indent="-228600" algn="l" defTabSz="914400" rtl="0" eaLnBrk="1" latinLnBrk="0" hangingPunct="1">
+              <a:lnSpc>
+                <a:spcPct val="90000"/>
+              </a:lnSpc>
+              <a:spcBef>
+                <a:spcPts val="500"/>
+              </a:spcBef>
+              <a:buFont typeface="Arial" panose="020B0604020202020204" pitchFamily="34" charset="0"/>
+              <a:buChar char="•"/>
+              <a:defRPr sz="2000" kern="1200">
+                <a:solidFill>
+                  <a:schemeClr val="tx1"/>
+                </a:solidFill>
+                <a:latin typeface="+mn-lt"/>
+                <a:ea typeface="+mn-ea"/>
+                <a:cs typeface="+mn-cs"/>
+              </a:defRPr>
+            </a:lvl3pPr>
+            <a:lvl4pPr marL="1600200" indent="-228600" algn="l" defTabSz="914400" rtl="0" eaLnBrk="1" latinLnBrk="0" hangingPunct="1">
+              <a:lnSpc>
+                <a:spcPct val="90000"/>
+              </a:lnSpc>
+              <a:spcBef>
+                <a:spcPts val="500"/>
+              </a:spcBef>
+              <a:buFont typeface="Arial" panose="020B0604020202020204" pitchFamily="34" charset="0"/>
+              <a:buChar char="•"/>
+              <a:defRPr sz="1800" kern="1200">
+                <a:solidFill>
+                  <a:schemeClr val="tx1"/>
+                </a:solidFill>
+                <a:latin typeface="+mn-lt"/>
+                <a:ea typeface="+mn-ea"/>
+                <a:cs typeface="+mn-cs"/>
+              </a:defRPr>
+            </a:lvl4pPr>
+            <a:lvl5pPr marL="2057400" indent="-228600" algn="l" defTabSz="914400" rtl="0" eaLnBrk="1" latinLnBrk="0" hangingPunct="1">
+              <a:lnSpc>
+                <a:spcPct val="90000"/>
+              </a:lnSpc>
+              <a:spcBef>
+                <a:spcPts val="500"/>
+              </a:spcBef>
+              <a:buFont typeface="Arial" panose="020B0604020202020204" pitchFamily="34" charset="0"/>
+              <a:buChar char="•"/>
+              <a:defRPr sz="1800" kern="1200">
+                <a:solidFill>
+                  <a:schemeClr val="tx1"/>
+                </a:solidFill>
+                <a:latin typeface="+mn-lt"/>
+                <a:ea typeface="+mn-ea"/>
+                <a:cs typeface="+mn-cs"/>
+              </a:defRPr>
+            </a:lvl5pPr>
+            <a:lvl6pPr marL="2514600" indent="-228600" algn="l" defTabSz="914400" rtl="0" eaLnBrk="1" latinLnBrk="0" hangingPunct="1">
+              <a:lnSpc>
+                <a:spcPct val="90000"/>
+              </a:lnSpc>
+              <a:spcBef>
+                <a:spcPts val="500"/>
+              </a:spcBef>
+              <a:buFont typeface="Arial" panose="020B0604020202020204" pitchFamily="34" charset="0"/>
+              <a:buChar char="•"/>
+              <a:defRPr sz="1800" kern="1200">
+                <a:solidFill>
+                  <a:schemeClr val="tx1"/>
+                </a:solidFill>
+                <a:latin typeface="+mn-lt"/>
+                <a:ea typeface="+mn-ea"/>
+                <a:cs typeface="+mn-cs"/>
+              </a:defRPr>
+            </a:lvl6pPr>
+            <a:lvl7pPr marL="2971800" indent="-228600" algn="l" defTabSz="914400" rtl="0" eaLnBrk="1" latinLnBrk="0" hangingPunct="1">
+              <a:lnSpc>
+                <a:spcPct val="90000"/>
+              </a:lnSpc>
+              <a:spcBef>
+                <a:spcPts val="500"/>
+              </a:spcBef>
+              <a:buFont typeface="Arial" panose="020B0604020202020204" pitchFamily="34" charset="0"/>
+              <a:buChar char="•"/>
+              <a:defRPr sz="1800" kern="1200">
+                <a:solidFill>
+                  <a:schemeClr val="tx1"/>
+                </a:solidFill>
+                <a:latin typeface="+mn-lt"/>
+                <a:ea typeface="+mn-ea"/>
+                <a:cs typeface="+mn-cs"/>
+              </a:defRPr>
+            </a:lvl7pPr>
+            <a:lvl8pPr marL="3429000" indent="-228600" algn="l" defTabSz="914400" rtl="0" eaLnBrk="1" latinLnBrk="0" hangingPunct="1">
+              <a:lnSpc>
+                <a:spcPct val="90000"/>
+              </a:lnSpc>
+              <a:spcBef>
+                <a:spcPts val="500"/>
+              </a:spcBef>
+              <a:buFont typeface="Arial" panose="020B0604020202020204" pitchFamily="34" charset="0"/>
+              <a:buChar char="•"/>
+              <a:defRPr sz="1800" kern="1200">
+                <a:solidFill>
+                  <a:schemeClr val="tx1"/>
+                </a:solidFill>
+                <a:latin typeface="+mn-lt"/>
+                <a:ea typeface="+mn-ea"/>
+                <a:cs typeface="+mn-cs"/>
+              </a:defRPr>
+            </a:lvl8pPr>
+            <a:lvl9pPr marL="3886200" indent="-228600" algn="l" defTabSz="914400" rtl="0" eaLnBrk="1" latinLnBrk="0" hangingPunct="1">
+              <a:lnSpc>
+                <a:spcPct val="90000"/>
+              </a:lnSpc>
+              <a:spcBef>
+                <a:spcPts val="500"/>
+              </a:spcBef>
+              <a:buFont typeface="Arial" panose="020B0604020202020204" pitchFamily="34" charset="0"/>
+              <a:buChar char="•"/>
+              <a:defRPr sz="1800" kern="1200">
+                <a:solidFill>
+                  <a:schemeClr val="tx1"/>
+                </a:solidFill>
+                <a:latin typeface="+mn-lt"/>
+                <a:ea typeface="+mn-ea"/>
+                <a:cs typeface="+mn-cs"/>
+              </a:defRPr>
+            </a:lvl9pPr>
+          </a:lstStyle>
+          <a:p>
+            <a:r>
+              <a:rPr lang="en-US" b="0" i="0" dirty="0">
+                <a:solidFill>
+                  <a:srgbClr val="333333"/>
+                </a:solidFill>
+                <a:effectLst/>
+                <a:latin typeface="AmazonEmber"/>
+              </a:rPr>
+              <a:t>S3</a:t>
+            </a:r>
+          </a:p>
+          <a:p>
+            <a:pPr lvl="1"/>
+            <a:r>
+              <a:rPr lang="en-US" dirty="0">
+                <a:solidFill>
+                  <a:srgbClr val="333333"/>
+                </a:solidFill>
+                <a:latin typeface="AmazonEmber"/>
+              </a:rPr>
+              <a:t>Free tier:</a:t>
+            </a:r>
+          </a:p>
+          <a:p>
+            <a:pPr lvl="2"/>
+            <a:r>
+              <a:rPr lang="en-US" b="0" i="0" dirty="0">
+                <a:solidFill>
+                  <a:srgbClr val="333333"/>
+                </a:solidFill>
+                <a:effectLst/>
+                <a:latin typeface="AmazonEmber"/>
+              </a:rPr>
+              <a:t>20,000 GET Requests</a:t>
+            </a:r>
+          </a:p>
+          <a:p>
+            <a:pPr lvl="2"/>
+            <a:r>
+              <a:rPr lang="en-US" b="0" i="0" dirty="0">
+                <a:solidFill>
+                  <a:srgbClr val="333333"/>
+                </a:solidFill>
+                <a:effectLst/>
+                <a:latin typeface="AmazonEmber"/>
+              </a:rPr>
+              <a:t>2,000 PUT, COPY, POST, or LIST Requests</a:t>
+            </a:r>
+          </a:p>
+          <a:p>
+            <a:pPr lvl="2"/>
+            <a:r>
+              <a:rPr lang="en-US" b="0" i="0" dirty="0">
+                <a:solidFill>
+                  <a:srgbClr val="333333"/>
+                </a:solidFill>
+                <a:effectLst/>
+                <a:latin typeface="AmazonEmber"/>
+              </a:rPr>
+              <a:t>100 GB of Data Transfer Out each month</a:t>
+            </a:r>
+            <a:endParaRPr lang="en-US" dirty="0">
+              <a:solidFill>
+                <a:srgbClr val="333333"/>
+              </a:solidFill>
+              <a:latin typeface="AmazonEmber"/>
+            </a:endParaRPr>
+          </a:p>
+          <a:p>
+            <a:pPr lvl="1"/>
+            <a:r>
+              <a:rPr lang="en-US" b="0" i="0" dirty="0">
+                <a:solidFill>
+                  <a:srgbClr val="333333"/>
+                </a:solidFill>
+                <a:effectLst/>
+                <a:latin typeface="AmazonEmber"/>
+              </a:rPr>
+              <a:t>Storage: </a:t>
+            </a:r>
+          </a:p>
+          <a:p>
+            <a:pPr lvl="2"/>
+            <a:r>
+              <a:rPr lang="en-US" b="0" i="0" dirty="0">
+                <a:solidFill>
+                  <a:srgbClr val="333333"/>
+                </a:solidFill>
+                <a:effectLst/>
+                <a:latin typeface="AmazonEmber"/>
+              </a:rPr>
+              <a:t>First 50 TB / Month: $0.023 per GB</a:t>
+            </a:r>
+          </a:p>
+          <a:p>
+            <a:pPr lvl="1"/>
+            <a:r>
+              <a:rPr lang="en-US" b="0" i="0" dirty="0">
+                <a:solidFill>
+                  <a:srgbClr val="333333"/>
+                </a:solidFill>
+                <a:effectLst/>
+                <a:latin typeface="AmazonEmber"/>
+              </a:rPr>
+              <a:t>Requests:</a:t>
+            </a:r>
+          </a:p>
+          <a:p>
+            <a:pPr lvl="2"/>
+            <a:r>
+              <a:rPr lang="en-US" b="0" i="0" dirty="0">
+                <a:solidFill>
+                  <a:srgbClr val="333333"/>
+                </a:solidFill>
+                <a:effectLst/>
+                <a:latin typeface="AmazonEmberBold"/>
+              </a:rPr>
+              <a:t>S3 Standard: </a:t>
+            </a:r>
+            <a:r>
+              <a:rPr lang="en-US" b="0" i="0" dirty="0">
+                <a:solidFill>
+                  <a:srgbClr val="333333"/>
+                </a:solidFill>
+                <a:effectLst/>
+                <a:latin typeface="AmazonEmber"/>
+              </a:rPr>
+              <a:t>$0.0004 per 1,000 GET requests</a:t>
+            </a:r>
+          </a:p>
+          <a:p>
+            <a:pPr lvl="1"/>
+            <a:r>
+              <a:rPr lang="en-US" b="0" i="0" dirty="0">
+                <a:solidFill>
+                  <a:srgbClr val="333333"/>
+                </a:solidFill>
+                <a:effectLst/>
+                <a:latin typeface="AmazonEmber"/>
+              </a:rPr>
+              <a:t>Data transfer:</a:t>
+            </a:r>
+          </a:p>
+          <a:p>
+            <a:pPr lvl="2"/>
+            <a:r>
+              <a:rPr lang="en-US" b="0" i="0" dirty="0">
+                <a:solidFill>
+                  <a:srgbClr val="333333"/>
+                </a:solidFill>
+                <a:effectLst/>
+                <a:latin typeface="AmazonEmber"/>
+              </a:rPr>
+              <a:t>First 10 TB / Month</a:t>
+            </a:r>
+            <a:r>
+              <a:rPr lang="en-US" dirty="0">
+                <a:solidFill>
+                  <a:srgbClr val="333333"/>
+                </a:solidFill>
+                <a:latin typeface="AmazonEmber"/>
+              </a:rPr>
+              <a:t>: </a:t>
+            </a:r>
+            <a:r>
+              <a:rPr lang="en-US" b="0" i="0" dirty="0">
+                <a:solidFill>
+                  <a:srgbClr val="333333"/>
+                </a:solidFill>
+                <a:effectLst/>
+                <a:latin typeface="AmazonEmber"/>
+              </a:rPr>
+              <a:t>$0.09 per GB</a:t>
+            </a:r>
+            <a:endParaRPr lang="en-US" sz="2000" dirty="0"/>
+          </a:p>
+          <a:p>
+            <a:pPr>
+              <a:lnSpc>
+                <a:spcPct val="70000"/>
+              </a:lnSpc>
+            </a:pPr>
+            <a:r>
+              <a:rPr lang="en-US" dirty="0">
+                <a:solidFill>
+                  <a:srgbClr val="333333"/>
+                </a:solidFill>
+                <a:latin typeface="AmazonEmber"/>
+              </a:rPr>
+              <a:t>Public Hosted Zone (optional)</a:t>
+            </a:r>
+          </a:p>
+          <a:p>
+            <a:pPr lvl="2"/>
+            <a:r>
+              <a:rPr lang="en-US" sz="2100" dirty="0">
+                <a:solidFill>
+                  <a:srgbClr val="333333"/>
+                </a:solidFill>
+                <a:latin typeface="AmazonEmberBold"/>
+              </a:rPr>
+              <a:t>$0.50 per hosted zone per month for the first 25 hosted zones</a:t>
+            </a:r>
+          </a:p>
+          <a:p>
+            <a:pPr>
+              <a:lnSpc>
+                <a:spcPct val="70000"/>
+              </a:lnSpc>
+            </a:pPr>
+            <a:endParaRPr lang="en-US" sz="2000" dirty="0"/>
+          </a:p>
+          <a:p>
+            <a:endParaRPr lang="en-US" dirty="0"/>
           </a:p>
         </p:txBody>
       </p:sp>
     </p:spTree>
     <p:extLst>
       <p:ext uri="{BB962C8B-B14F-4D97-AF65-F5344CB8AC3E}">
-        <p14:creationId xmlns:p14="http://schemas.microsoft.com/office/powerpoint/2010/main" val="2615662091"/>
+        <p14:creationId xmlns:p14="http://schemas.microsoft.com/office/powerpoint/2010/main" val="4226920793"/>
       </p:ext>
     </p:extLst>
   </p:cSld>
@@ -6036,7 +6604,7 @@
           <p:cNvPr id="2" name="Title 1">
             <a:extLst>
               <a:ext uri="{FF2B5EF4-FFF2-40B4-BE49-F238E27FC236}">
-                <a16:creationId xmlns:a16="http://schemas.microsoft.com/office/drawing/2014/main" id="{A60DB5D8-CE77-728C-CE2B-E19F2D092B1C}"/>
+                <a16:creationId xmlns:a16="http://schemas.microsoft.com/office/drawing/2014/main" id="{6897399F-E076-F20F-D38F-4A2571C07825}"/>
               </a:ext>
             </a:extLst>
           </p:cNvPr>
@@ -6054,7 +6622,7 @@
           <a:p>
             <a:r>
               <a:rPr lang="en-US" dirty="0"/>
-              <a:t>Domain</a:t>
+              <a:t>DevOps</a:t>
             </a:r>
           </a:p>
         </p:txBody>
@@ -6064,7 +6632,7 @@
           <p:cNvPr id="3" name="Content Placeholder 2">
             <a:extLst>
               <a:ext uri="{FF2B5EF4-FFF2-40B4-BE49-F238E27FC236}">
-                <a16:creationId xmlns:a16="http://schemas.microsoft.com/office/drawing/2014/main" id="{A0CE8C8B-36C9-C096-1664-3C50F7E7150E}"/>
+                <a16:creationId xmlns:a16="http://schemas.microsoft.com/office/drawing/2014/main" id="{3BC48F5B-529C-65B6-00CA-3ED2D7299BB8}"/>
               </a:ext>
             </a:extLst>
           </p:cNvPr>
@@ -6081,51 +6649,14 @@
           <a:lstStyle/>
           <a:p>
             <a:r>
-              <a:rPr lang="en-US" dirty="0" err="1"/>
-              <a:t>CloudFlare</a:t>
-            </a:r>
-            <a:endParaRPr lang="en-US" dirty="0"/>
-          </a:p>
-          <a:p>
-            <a:pPr lvl="1"/>
-            <a:r>
               <a:rPr lang="en-US" dirty="0"/>
-              <a:t>Pros:</a:t>
-            </a:r>
-          </a:p>
-          <a:p>
-            <a:pPr lvl="2"/>
+              <a:t>GitHub + GitHub Action</a:t>
+            </a:r>
+          </a:p>
+          <a:p>
             <a:r>
               <a:rPr lang="en-US" dirty="0"/>
-              <a:t>No extra charge</a:t>
-            </a:r>
-          </a:p>
-          <a:p>
-            <a:pPr lvl="1"/>
-            <a:r>
-              <a:rPr lang="en-US" dirty="0"/>
-              <a:t>Cons:</a:t>
-            </a:r>
-          </a:p>
-          <a:p>
-            <a:pPr lvl="2"/>
-            <a:r>
-              <a:rPr lang="en-US" dirty="0"/>
-              <a:t>Have to use their DNS</a:t>
-            </a:r>
-          </a:p>
-          <a:p>
-            <a:pPr lvl="3"/>
-            <a:r>
-              <a:rPr lang="en-US" dirty="0"/>
-              <a:t>Only need Route 53 for SSL cert validation which is one time setup.</a:t>
-            </a:r>
-          </a:p>
-          <a:p>
-            <a:pPr lvl="3"/>
-            <a:r>
-              <a:rPr lang="en-US" dirty="0"/>
-              <a:t>Save $0.50 a month.</a:t>
+              <a:t>Azure DevOps + Pipelines</a:t>
             </a:r>
           </a:p>
         </p:txBody>
@@ -6133,7 +6664,7 @@
     </p:spTree>
     <p:extLst>
       <p:ext uri="{BB962C8B-B14F-4D97-AF65-F5344CB8AC3E}">
-        <p14:creationId xmlns:p14="http://schemas.microsoft.com/office/powerpoint/2010/main" val="1191592447"/>
+        <p14:creationId xmlns:p14="http://schemas.microsoft.com/office/powerpoint/2010/main" val="3286117393"/>
       </p:ext>
     </p:extLst>
   </p:cSld>
@@ -6165,7 +6696,7 @@
           <p:cNvPr id="2" name="Title 1">
             <a:extLst>
               <a:ext uri="{FF2B5EF4-FFF2-40B4-BE49-F238E27FC236}">
-                <a16:creationId xmlns:a16="http://schemas.microsoft.com/office/drawing/2014/main" id="{6897399F-E076-F20F-D38F-4A2571C07825}"/>
+                <a16:creationId xmlns:a16="http://schemas.microsoft.com/office/drawing/2014/main" id="{441D12ED-0212-C6C6-4E9B-87A71DFDA59A}"/>
               </a:ext>
             </a:extLst>
           </p:cNvPr>
@@ -6183,7 +6714,7 @@
           <a:p>
             <a:r>
               <a:rPr lang="en-US" dirty="0"/>
-              <a:t>DevOps</a:t>
+              <a:t>Backend</a:t>
             </a:r>
           </a:p>
         </p:txBody>
@@ -6193,7 +6724,7 @@
           <p:cNvPr id="3" name="Content Placeholder 2">
             <a:extLst>
               <a:ext uri="{FF2B5EF4-FFF2-40B4-BE49-F238E27FC236}">
-                <a16:creationId xmlns:a16="http://schemas.microsoft.com/office/drawing/2014/main" id="{3BC48F5B-529C-65B6-00CA-3ED2D7299BB8}"/>
+                <a16:creationId xmlns:a16="http://schemas.microsoft.com/office/drawing/2014/main" id="{3BF5319E-5898-EFA6-91A6-24FAFE06BE92}"/>
               </a:ext>
             </a:extLst>
           </p:cNvPr>
@@ -6211,13 +6742,13 @@
           <a:p>
             <a:r>
               <a:rPr lang="en-US" dirty="0"/>
-              <a:t>GitHub + GitHub Action</a:t>
+              <a:t>Lambda</a:t>
             </a:r>
           </a:p>
           <a:p>
             <a:r>
               <a:rPr lang="en-US" dirty="0"/>
-              <a:t>Azure DevOps + Pipelines</a:t>
+              <a:t>DynamoDB (on-demand)</a:t>
             </a:r>
           </a:p>
         </p:txBody>
@@ -6225,7 +6756,7 @@
     </p:spTree>
     <p:extLst>
       <p:ext uri="{BB962C8B-B14F-4D97-AF65-F5344CB8AC3E}">
-        <p14:creationId xmlns:p14="http://schemas.microsoft.com/office/powerpoint/2010/main" val="3286117393"/>
+        <p14:creationId xmlns:p14="http://schemas.microsoft.com/office/powerpoint/2010/main" val="823141136"/>
       </p:ext>
     </p:extLst>
   </p:cSld>
@@ -6257,7 +6788,7 @@
           <p:cNvPr id="2" name="Title 1">
             <a:extLst>
               <a:ext uri="{FF2B5EF4-FFF2-40B4-BE49-F238E27FC236}">
-                <a16:creationId xmlns:a16="http://schemas.microsoft.com/office/drawing/2014/main" id="{441D12ED-0212-C6C6-4E9B-87A71DFDA59A}"/>
+                <a16:creationId xmlns:a16="http://schemas.microsoft.com/office/drawing/2014/main" id="{4711F3A5-DEF1-3F66-5967-3881E030DD33}"/>
               </a:ext>
             </a:extLst>
           </p:cNvPr>
@@ -6275,7 +6806,114 @@
           <a:p>
             <a:r>
               <a:rPr lang="en-US" dirty="0"/>
-              <a:t>Backend</a:t>
+              <a:t>Iron Triangle</a:t>
+            </a:r>
+          </a:p>
+        </p:txBody>
+      </p:sp>
+      <p:pic>
+        <p:nvPicPr>
+          <p:cNvPr id="1028" name="Picture 4">
+            <a:extLst>
+              <a:ext uri="{FF2B5EF4-FFF2-40B4-BE49-F238E27FC236}">
+                <a16:creationId xmlns:a16="http://schemas.microsoft.com/office/drawing/2014/main" id="{81CB98AD-44EC-34BC-E797-8F0E4D369B2E}"/>
+              </a:ext>
+            </a:extLst>
+          </p:cNvPr>
+          <p:cNvPicPr>
+            <a:picLocks noGrp="1" noChangeAspect="1" noChangeArrowheads="1"/>
+          </p:cNvPicPr>
+          <p:nvPr>
+            <p:ph idx="1"/>
+          </p:nvPr>
+        </p:nvPicPr>
+        <p:blipFill>
+          <a:blip r:embed="rId2">
+            <a:extLst>
+              <a:ext uri="{28A0092B-C50C-407E-A947-70E740481C1C}">
+                <a14:useLocalDpi xmlns:a14="http://schemas.microsoft.com/office/drawing/2010/main" val="0"/>
+              </a:ext>
+            </a:extLst>
+          </a:blip>
+          <a:srcRect/>
+          <a:stretch>
+            <a:fillRect/>
+          </a:stretch>
+        </p:blipFill>
+        <p:spPr bwMode="auto">
+          <a:xfrm>
+            <a:off x="1180552" y="1560646"/>
+            <a:ext cx="5100107" cy="4351338"/>
+          </a:xfrm>
+          <a:prstGeom prst="rect">
+            <a:avLst/>
+          </a:prstGeom>
+          <a:noFill/>
+          <a:extLst>
+            <a:ext uri="{909E8E84-426E-40DD-AFC4-6F175D3DCCD1}">
+              <a14:hiddenFill xmlns:a14="http://schemas.microsoft.com/office/drawing/2010/main">
+                <a:solidFill>
+                  <a:srgbClr val="FFFFFF"/>
+                </a:solidFill>
+              </a14:hiddenFill>
+            </a:ext>
+          </a:extLst>
+        </p:spPr>
+      </p:pic>
+    </p:spTree>
+    <p:extLst>
+      <p:ext uri="{BB962C8B-B14F-4D97-AF65-F5344CB8AC3E}">
+        <p14:creationId xmlns:p14="http://schemas.microsoft.com/office/powerpoint/2010/main" val="2897933192"/>
+      </p:ext>
+    </p:extLst>
+  </p:cSld>
+  <p:clrMapOvr>
+    <a:masterClrMapping/>
+  </p:clrMapOvr>
+</p:sld>
+</file>
+
+<file path=ppt/slides/slide14.xml><?xml version="1.0" encoding="utf-8"?>
+<p:sld xmlns:a="http://schemas.openxmlformats.org/drawingml/2006/main" xmlns:r="http://schemas.openxmlformats.org/officeDocument/2006/relationships" xmlns:p="http://schemas.openxmlformats.org/presentationml/2006/main">
+  <p:cSld>
+    <p:spTree>
+      <p:nvGrpSpPr>
+        <p:cNvPr id="1" name=""/>
+        <p:cNvGrpSpPr/>
+        <p:nvPr/>
+      </p:nvGrpSpPr>
+      <p:grpSpPr>
+        <a:xfrm>
+          <a:off x="0" y="0"/>
+          <a:ext cx="0" cy="0"/>
+          <a:chOff x="0" y="0"/>
+          <a:chExt cx="0" cy="0"/>
+        </a:xfrm>
+      </p:grpSpPr>
+      <p:sp>
+        <p:nvSpPr>
+          <p:cNvPr id="2" name="Title 1">
+            <a:extLst>
+              <a:ext uri="{FF2B5EF4-FFF2-40B4-BE49-F238E27FC236}">
+                <a16:creationId xmlns:a16="http://schemas.microsoft.com/office/drawing/2014/main" id="{44633A58-0109-55B4-2249-0E4CB36F6567}"/>
+              </a:ext>
+            </a:extLst>
+          </p:cNvPr>
+          <p:cNvSpPr>
+            <a:spLocks noGrp="1"/>
+          </p:cNvSpPr>
+          <p:nvPr>
+            <p:ph type="title"/>
+          </p:nvPr>
+        </p:nvSpPr>
+        <p:spPr/>
+        <p:txBody>
+          <a:bodyPr/>
+          <a:lstStyle/>
+          <a:p>
+            <a:r>
+              <a:rPr lang="en-US" dirty="0"/>
+              <a:t>Bonus</a:t>
             </a:r>
           </a:p>
         </p:txBody>
@@ -6285,7 +6923,7 @@
           <p:cNvPr id="3" name="Content Placeholder 2">
             <a:extLst>
               <a:ext uri="{FF2B5EF4-FFF2-40B4-BE49-F238E27FC236}">
-                <a16:creationId xmlns:a16="http://schemas.microsoft.com/office/drawing/2014/main" id="{3BF5319E-5898-EFA6-91A6-24FAFE06BE92}"/>
+                <a16:creationId xmlns:a16="http://schemas.microsoft.com/office/drawing/2014/main" id="{971331A3-80C5-47C4-D189-27B59B19BA98}"/>
               </a:ext>
             </a:extLst>
           </p:cNvPr>
@@ -6303,13 +6941,21 @@
           <a:p>
             <a:r>
               <a:rPr lang="en-US" dirty="0"/>
-              <a:t>Lambda</a:t>
-            </a:r>
-          </a:p>
-          <a:p>
+              <a:t>Email</a:t>
+            </a:r>
+          </a:p>
+          <a:p>
+            <a:pPr lvl="1"/>
             <a:r>
               <a:rPr lang="en-US" dirty="0"/>
-              <a:t>DynamoDB (on-demand)</a:t>
+              <a:t>Receive: Forward to public email</a:t>
+            </a:r>
+          </a:p>
+          <a:p>
+            <a:pPr lvl="1"/>
+            <a:r>
+              <a:rPr lang="en-US" dirty="0"/>
+              <a:t>Send: SES</a:t>
             </a:r>
           </a:p>
         </p:txBody>
@@ -6317,7 +6963,7 @@
     </p:spTree>
     <p:extLst>
       <p:ext uri="{BB962C8B-B14F-4D97-AF65-F5344CB8AC3E}">
-        <p14:creationId xmlns:p14="http://schemas.microsoft.com/office/powerpoint/2010/main" val="823141136"/>
+        <p14:creationId xmlns:p14="http://schemas.microsoft.com/office/powerpoint/2010/main" val="3120713115"/>
       </p:ext>
     </p:extLst>
   </p:cSld>
@@ -6398,44 +7044,18 @@
               <a:t>Experience</a:t>
             </a:r>
             <a:r>
+              <a:rPr lang="en-US"/>
+              <a:t>: Software</a:t>
+            </a:r>
+            <a:r>
               <a:rPr lang="en-US" dirty="0"/>
-              <a:t>: Software, DevOps, Cloud Ops engineer</a:t>
-            </a:r>
-          </a:p>
-          <a:p>
-            <a:r>
-              <a:rPr lang="en-US" b="1" dirty="0"/>
-              <a:t>Interests</a:t>
-            </a:r>
-            <a:r>
-              <a:rPr lang="en-US" dirty="0"/>
-              <a:t>: Learning, Reading, Running, etc.</a:t>
+              <a:t>, DevOps, Cloud Ops engineer</a:t>
             </a:r>
           </a:p>
           <a:p>
             <a:r>
               <a:rPr lang="en-US" b="1" dirty="0"/>
               <a:t>GitHub</a:t>
-            </a:r>
-            <a:r>
-              <a:rPr lang="en-US" dirty="0"/>
-              <a:t>: https://github.com/nik-yo</a:t>
-            </a:r>
-          </a:p>
-          <a:p>
-            <a:r>
-              <a:rPr lang="en-US" b="1" dirty="0"/>
-              <a:t>LinkedIn</a:t>
-            </a:r>
-            <a:r>
-              <a:rPr lang="en-US" dirty="0"/>
-              <a:t>: https://www.linkedin.com/in/nikkiyodo/</a:t>
-            </a:r>
-          </a:p>
-          <a:p>
-            <a:r>
-              <a:rPr lang="en-US" b="1" dirty="0"/>
-              <a:t>Consulting</a:t>
             </a:r>
             <a:r>
               <a:rPr lang="en-US" dirty="0"/>
@@ -6445,6 +7065,46 @@
               <a:rPr lang="en-US" dirty="0">
                 <a:hlinkClick r:id="rId2"/>
               </a:rPr>
+              <a:t>https://github.com/nik-yo</a:t>
+            </a:r>
+            <a:r>
+              <a:rPr lang="en-US" dirty="0"/>
+              <a:t> </a:t>
+            </a:r>
+          </a:p>
+          <a:p>
+            <a:r>
+              <a:rPr lang="en-US" b="1" dirty="0"/>
+              <a:t>LinkedIn</a:t>
+            </a:r>
+            <a:r>
+              <a:rPr lang="en-US" dirty="0"/>
+              <a:t>: </a:t>
+            </a:r>
+            <a:r>
+              <a:rPr lang="en-US" dirty="0">
+                <a:hlinkClick r:id="rId3"/>
+              </a:rPr>
+              <a:t>https://www.linkedin.com/in/nikkiyodo/</a:t>
+            </a:r>
+            <a:r>
+              <a:rPr lang="en-US" dirty="0"/>
+              <a:t> </a:t>
+            </a:r>
+          </a:p>
+          <a:p>
+            <a:r>
+              <a:rPr lang="en-US" b="1" dirty="0"/>
+              <a:t>Consulting</a:t>
+            </a:r>
+            <a:r>
+              <a:rPr lang="en-US" dirty="0"/>
+              <a:t>: </a:t>
+            </a:r>
+            <a:r>
+              <a:rPr lang="en-US" dirty="0">
+                <a:hlinkClick r:id="rId4"/>
+              </a:rPr>
               <a:t>www.nikyotech.com</a:t>
             </a:r>
             <a:endParaRPr lang="en-US" dirty="0"/>
@@ -6456,7 +7116,17 @@
             </a:r>
             <a:r>
               <a:rPr lang="en-US" dirty="0"/>
-              <a:t>: nikki.yodo@nikyotech.com</a:t>
+              <a:t>: </a:t>
+            </a:r>
+            <a:r>
+              <a:rPr lang="en-US" dirty="0">
+                <a:hlinkClick r:id="rId5"/>
+              </a:rPr>
+              <a:t>nikki.yodo@nikyotech.com</a:t>
+            </a:r>
+            <a:r>
+              <a:rPr lang="en-US" dirty="0"/>
+              <a:t> </a:t>
             </a:r>
           </a:p>
         </p:txBody>
@@ -6547,38 +7217,26 @@
           </a:p>
           <a:p>
             <a:r>
-              <a:rPr lang="en-US" b="1" dirty="0"/>
-              <a:t>Quality</a:t>
-            </a:r>
-            <a:r>
               <a:rPr lang="en-US" dirty="0"/>
-              <a:t>: Durable hosting, robust features, battle tested</a:t>
-            </a:r>
-          </a:p>
-          <a:p>
-            <a:r>
-              <a:rPr lang="en-US" b="1" dirty="0"/>
-              <a:t>Time</a:t>
-            </a:r>
+              <a:t>Easy to develop</a:t>
+            </a:r>
+          </a:p>
+          <a:p>
             <a:r>
               <a:rPr lang="en-US" dirty="0"/>
-              <a:t>: Fast development and deployment</a:t>
-            </a:r>
-          </a:p>
-          <a:p>
-            <a:r>
-              <a:rPr lang="en-US" b="1" dirty="0"/>
-              <a:t>Cost</a:t>
-            </a:r>
+              <a:t>Automated deployment</a:t>
+            </a:r>
+          </a:p>
+          <a:p>
             <a:r>
               <a:rPr lang="en-US" dirty="0"/>
-              <a:t>: Affordable</a:t>
+              <a:t>Widely supported technology</a:t>
             </a:r>
           </a:p>
           <a:p>
             <a:r>
               <a:rPr lang="en-US" dirty="0"/>
-              <a:t>Lowest web hosting cost is $2-$5 a month. Can we do better?</a:t>
+              <a:t>Lowest web hosting cost is $2-$12 a month. Can we do better?</a:t>
             </a:r>
           </a:p>
         </p:txBody>
@@ -6618,7 +7276,7 @@
           <p:cNvPr id="2" name="Title 1">
             <a:extLst>
               <a:ext uri="{FF2B5EF4-FFF2-40B4-BE49-F238E27FC236}">
-                <a16:creationId xmlns:a16="http://schemas.microsoft.com/office/drawing/2014/main" id="{4711F3A5-DEF1-3F66-5967-3881E030DD33}"/>
+                <a16:creationId xmlns:a16="http://schemas.microsoft.com/office/drawing/2014/main" id="{AAF56342-0D4A-477B-0441-ABB8A3D603C7}"/>
               </a:ext>
             </a:extLst>
           </p:cNvPr>
@@ -6636,64 +7294,73 @@
           <a:p>
             <a:r>
               <a:rPr lang="en-US" dirty="0"/>
-              <a:t>Iron Triangle</a:t>
-            </a:r>
-          </a:p>
-        </p:txBody>
-      </p:sp>
-      <p:pic>
-        <p:nvPicPr>
-          <p:cNvPr id="1028" name="Picture 4">
+              <a:t>Stack</a:t>
+            </a:r>
+          </a:p>
+        </p:txBody>
+      </p:sp>
+      <p:sp>
+        <p:nvSpPr>
+          <p:cNvPr id="3" name="Content Placeholder 2">
             <a:extLst>
               <a:ext uri="{FF2B5EF4-FFF2-40B4-BE49-F238E27FC236}">
-                <a16:creationId xmlns:a16="http://schemas.microsoft.com/office/drawing/2014/main" id="{81CB98AD-44EC-34BC-E797-8F0E4D369B2E}"/>
+                <a16:creationId xmlns:a16="http://schemas.microsoft.com/office/drawing/2014/main" id="{1E67BE12-AFA5-0A1A-AF66-3280A3533C8C}"/>
               </a:ext>
             </a:extLst>
           </p:cNvPr>
-          <p:cNvPicPr>
-            <a:picLocks noGrp="1" noChangeAspect="1" noChangeArrowheads="1"/>
-          </p:cNvPicPr>
+          <p:cNvSpPr>
+            <a:spLocks noGrp="1"/>
+          </p:cNvSpPr>
           <p:nvPr>
             <p:ph idx="1"/>
           </p:nvPr>
-        </p:nvPicPr>
-        <p:blipFill>
-          <a:blip r:embed="rId2">
-            <a:extLst>
-              <a:ext uri="{28A0092B-C50C-407E-A947-70E740481C1C}">
-                <a14:useLocalDpi xmlns:a14="http://schemas.microsoft.com/office/drawing/2010/main" val="0"/>
-              </a:ext>
-            </a:extLst>
-          </a:blip>
-          <a:srcRect/>
-          <a:stretch>
-            <a:fillRect/>
-          </a:stretch>
-        </p:blipFill>
-        <p:spPr bwMode="auto">
-          <a:xfrm>
-            <a:off x="1180552" y="1560646"/>
-            <a:ext cx="5100107" cy="4351338"/>
-          </a:xfrm>
-          <a:prstGeom prst="rect">
-            <a:avLst/>
-          </a:prstGeom>
-          <a:noFill/>
-          <a:extLst>
-            <a:ext uri="{909E8E84-426E-40DD-AFC4-6F175D3DCCD1}">
-              <a14:hiddenFill xmlns:a14="http://schemas.microsoft.com/office/drawing/2010/main">
-                <a:solidFill>
-                  <a:srgbClr val="FFFFFF"/>
-                </a:solidFill>
-              </a14:hiddenFill>
-            </a:ext>
-          </a:extLst>
-        </p:spPr>
-      </p:pic>
+        </p:nvSpPr>
+        <p:spPr/>
+        <p:txBody>
+          <a:bodyPr/>
+          <a:lstStyle/>
+          <a:p>
+            <a:r>
+              <a:rPr lang="en-US" dirty="0"/>
+              <a:t>CloudFront</a:t>
+            </a:r>
+          </a:p>
+          <a:p>
+            <a:r>
+              <a:rPr lang="en-US" dirty="0"/>
+              <a:t>ACM for SSL Certificate</a:t>
+            </a:r>
+          </a:p>
+          <a:p>
+            <a:r>
+              <a:rPr lang="en-US" dirty="0"/>
+              <a:t>S3</a:t>
+            </a:r>
+          </a:p>
+          <a:p>
+            <a:r>
+              <a:rPr lang="en-US" dirty="0"/>
+              <a:t>SPA (Next.js)</a:t>
+            </a:r>
+          </a:p>
+          <a:p>
+            <a:r>
+              <a:rPr lang="en-US" dirty="0"/>
+              <a:t>GitHub</a:t>
+            </a:r>
+          </a:p>
+          <a:p>
+            <a:r>
+              <a:rPr lang="en-US" dirty="0"/>
+              <a:t>Route 53 Public Hosted Zone (optional)</a:t>
+            </a:r>
+          </a:p>
+        </p:txBody>
+      </p:sp>
     </p:spTree>
     <p:extLst>
       <p:ext uri="{BB962C8B-B14F-4D97-AF65-F5344CB8AC3E}">
-        <p14:creationId xmlns:p14="http://schemas.microsoft.com/office/powerpoint/2010/main" val="2897933192"/>
+        <p14:creationId xmlns:p14="http://schemas.microsoft.com/office/powerpoint/2010/main" val="1720777520"/>
       </p:ext>
     </p:extLst>
   </p:cSld>
@@ -6725,7 +7392,7 @@
           <p:cNvPr id="2" name="Title 1">
             <a:extLst>
               <a:ext uri="{FF2B5EF4-FFF2-40B4-BE49-F238E27FC236}">
-                <a16:creationId xmlns:a16="http://schemas.microsoft.com/office/drawing/2014/main" id="{AAF56342-0D4A-477B-0441-ABB8A3D603C7}"/>
+                <a16:creationId xmlns:a16="http://schemas.microsoft.com/office/drawing/2014/main" id="{EA74AC69-77FF-5140-0C1C-337765E48116}"/>
               </a:ext>
             </a:extLst>
           </p:cNvPr>
@@ -6743,7 +7410,7 @@
           <a:p>
             <a:r>
               <a:rPr lang="en-US" dirty="0"/>
-              <a:t>Stack</a:t>
+              <a:t>Why Next.js?</a:t>
             </a:r>
           </a:p>
         </p:txBody>
@@ -6753,7 +7420,7 @@
           <p:cNvPr id="3" name="Content Placeholder 2">
             <a:extLst>
               <a:ext uri="{FF2B5EF4-FFF2-40B4-BE49-F238E27FC236}">
-                <a16:creationId xmlns:a16="http://schemas.microsoft.com/office/drawing/2014/main" id="{1E67BE12-AFA5-0A1A-AF66-3280A3533C8C}"/>
+                <a16:creationId xmlns:a16="http://schemas.microsoft.com/office/drawing/2014/main" id="{6D522802-4829-CCCA-907E-58207004365E}"/>
               </a:ext>
             </a:extLst>
           </p:cNvPr>
@@ -6771,45 +7438,43 @@
           <a:p>
             <a:r>
               <a:rPr lang="en-US" dirty="0"/>
-              <a:t>CloudFront</a:t>
+              <a:t>ReactJS/NodeJS based, wide community support</a:t>
             </a:r>
           </a:p>
           <a:p>
             <a:r>
               <a:rPr lang="en-US" dirty="0"/>
-              <a:t>ACM for SSL Certificate</a:t>
+              <a:t>Support SSG (Static Site Generation) and SSR (Server Site Rendering)</a:t>
             </a:r>
           </a:p>
           <a:p>
             <a:r>
               <a:rPr lang="en-US" dirty="0"/>
-              <a:t>S3</a:t>
+              <a:t>SEO friendly</a:t>
             </a:r>
           </a:p>
           <a:p>
             <a:r>
               <a:rPr lang="en-US" dirty="0"/>
-              <a:t>SPA (Next.js)</a:t>
+              <a:t>Built-in router (folder based)</a:t>
             </a:r>
           </a:p>
           <a:p>
             <a:r>
               <a:rPr lang="en-US" dirty="0"/>
-              <a:t>GitHub</a:t>
-            </a:r>
-          </a:p>
-          <a:p>
-            <a:r>
-              <a:rPr lang="en-US" dirty="0"/>
-              <a:t>Route 53 Public Hosted Zone (optional)</a:t>
-            </a:r>
+              <a:t>Support Tailwind CSS (utility first) out of the box</a:t>
+            </a:r>
+          </a:p>
+          <a:p>
+            <a:pPr lvl="1"/>
+            <a:endParaRPr lang="en-US" dirty="0"/>
           </a:p>
         </p:txBody>
       </p:sp>
     </p:spTree>
     <p:extLst>
       <p:ext uri="{BB962C8B-B14F-4D97-AF65-F5344CB8AC3E}">
-        <p14:creationId xmlns:p14="http://schemas.microsoft.com/office/powerpoint/2010/main" val="1720777520"/>
+        <p14:creationId xmlns:p14="http://schemas.microsoft.com/office/powerpoint/2010/main" val="3759599464"/>
       </p:ext>
     </p:extLst>
   </p:cSld>
@@ -6841,7 +7506,7 @@
           <p:cNvPr id="2" name="Title 1">
             <a:extLst>
               <a:ext uri="{FF2B5EF4-FFF2-40B4-BE49-F238E27FC236}">
-                <a16:creationId xmlns:a16="http://schemas.microsoft.com/office/drawing/2014/main" id="{EA74AC69-77FF-5140-0C1C-337765E48116}"/>
+                <a16:creationId xmlns:a16="http://schemas.microsoft.com/office/drawing/2014/main" id="{459E2191-5532-10AD-63D5-7DD2D5335982}"/>
               </a:ext>
             </a:extLst>
           </p:cNvPr>
@@ -6859,7 +7524,7 @@
           <a:p>
             <a:r>
               <a:rPr lang="en-US" dirty="0"/>
-              <a:t>Quality</a:t>
+              <a:t>Implementation</a:t>
             </a:r>
           </a:p>
         </p:txBody>
@@ -6869,7 +7534,7 @@
           <p:cNvPr id="3" name="Content Placeholder 2">
             <a:extLst>
               <a:ext uri="{FF2B5EF4-FFF2-40B4-BE49-F238E27FC236}">
-                <a16:creationId xmlns:a16="http://schemas.microsoft.com/office/drawing/2014/main" id="{6D522802-4829-CCCA-907E-58207004365E}"/>
+                <a16:creationId xmlns:a16="http://schemas.microsoft.com/office/drawing/2014/main" id="{AD8F1DF8-05A6-B268-896F-6516F7C8F6BE}"/>
               </a:ext>
             </a:extLst>
           </p:cNvPr>
@@ -6882,105 +7547,94 @@
         </p:nvSpPr>
         <p:spPr/>
         <p:txBody>
-          <a:bodyPr/>
-          <a:lstStyle/>
-          <a:p>
-            <a:r>
-              <a:rPr lang="en-US" b="1" dirty="0"/>
-              <a:t>CloudFront</a:t>
-            </a:r>
+          <a:bodyPr>
+            <a:normAutofit lnSpcReduction="10000"/>
+          </a:bodyPr>
+          <a:lstStyle/>
+          <a:p>
             <a:r>
               <a:rPr lang="en-US" dirty="0"/>
-              <a:t>: </a:t>
-            </a:r>
-            <a:r>
-              <a:rPr lang="en-US" b="0" i="0" dirty="0">
-                <a:solidFill>
-                  <a:srgbClr val="0C0D0E"/>
-                </a:solidFill>
-                <a:effectLst/>
-                <a:latin typeface="-apple-system"/>
-              </a:rPr>
-              <a:t>99.9% uptime</a:t>
-            </a:r>
-            <a:endParaRPr lang="en-US" dirty="0"/>
-          </a:p>
-          <a:p>
-            <a:r>
-              <a:rPr lang="en-US" b="1" dirty="0"/>
-              <a:t>S3</a:t>
-            </a:r>
+              <a:t>Development:</a:t>
+            </a:r>
+          </a:p>
+          <a:p>
+            <a:pPr lvl="1"/>
             <a:r>
               <a:rPr lang="en-US" dirty="0"/>
-              <a:t>: </a:t>
-            </a:r>
-            <a:r>
-              <a:rPr lang="en-US" b="0" i="0" dirty="0">
-                <a:solidFill>
-                  <a:srgbClr val="16191F"/>
-                </a:solidFill>
-                <a:effectLst/>
-                <a:latin typeface="Amazon Ember"/>
-              </a:rPr>
-              <a:t>99.999999999% durability, 99.99% availability</a:t>
-            </a:r>
-          </a:p>
-          <a:p>
-            <a:r>
-              <a:rPr lang="en-US" b="1" dirty="0">
-                <a:solidFill>
-                  <a:srgbClr val="16191F"/>
-                </a:solidFill>
-                <a:latin typeface="Amazon Ember"/>
-              </a:rPr>
-              <a:t>Next.js</a:t>
+              <a:t>Application: </a:t>
+            </a:r>
+          </a:p>
+          <a:p>
+            <a:pPr lvl="2"/>
+            <a:r>
+              <a:rPr lang="en-US" dirty="0"/>
+              <a:t>Next.js has a small learning curve</a:t>
+            </a:r>
+          </a:p>
+          <a:p>
+            <a:pPr lvl="2"/>
+            <a:r>
+              <a:rPr lang="en-US" dirty="0"/>
+              <a:t>Tailwind CSS is easy to learn</a:t>
             </a:r>
           </a:p>
           <a:p>
             <a:pPr lvl="1"/>
             <a:r>
               <a:rPr lang="en-US" dirty="0"/>
-              <a:t>ReactJS/NodeJS based, wide community support</a:t>
+              <a:t>Infrastructure:</a:t>
+            </a:r>
+          </a:p>
+          <a:p>
+            <a:pPr lvl="2"/>
+            <a:r>
+              <a:rPr lang="en-US" dirty="0" err="1"/>
+              <a:t>IaC</a:t>
+            </a:r>
+            <a:r>
+              <a:rPr lang="en-US" dirty="0"/>
+              <a:t> (CloudFormation, Terraform, CDK)</a:t>
+            </a:r>
+          </a:p>
+          <a:p>
+            <a:r>
+              <a:rPr lang="en-US" dirty="0"/>
+              <a:t>Deployment:</a:t>
             </a:r>
           </a:p>
           <a:p>
             <a:pPr lvl="1"/>
             <a:r>
               <a:rPr lang="en-US" dirty="0"/>
-              <a:t>Support SSG (Static Site Generation) and SSR (Server Site Rendering)</a:t>
+              <a:t>GitHub Action has small learning curve</a:t>
+            </a:r>
+          </a:p>
+          <a:p>
+            <a:r>
+              <a:rPr lang="en-US" dirty="0"/>
+              <a:t>Operational:</a:t>
             </a:r>
           </a:p>
           <a:p>
             <a:pPr lvl="1"/>
             <a:r>
               <a:rPr lang="en-US" dirty="0"/>
-              <a:t>SEO friendly</a:t>
+              <a:t>CloudFront caching</a:t>
             </a:r>
           </a:p>
           <a:p>
             <a:pPr lvl="1"/>
             <a:r>
               <a:rPr lang="en-US" dirty="0"/>
-              <a:t>Built-in router (folder based)</a:t>
-            </a:r>
-          </a:p>
-          <a:p>
-            <a:pPr lvl="1"/>
-            <a:r>
-              <a:rPr lang="en-US" dirty="0"/>
-              <a:t>Support Tailwind CSS (utility first) out of the box</a:t>
-            </a:r>
-          </a:p>
-          <a:p>
-            <a:pPr lvl="1"/>
-            <a:endParaRPr lang="en-US" dirty="0"/>
+              <a:t>Static Files served by S3</a:t>
+            </a:r>
           </a:p>
         </p:txBody>
       </p:sp>
     </p:spTree>
     <p:extLst>
       <p:ext uri="{BB962C8B-B14F-4D97-AF65-F5344CB8AC3E}">
-        <p14:creationId xmlns:p14="http://schemas.microsoft.com/office/powerpoint/2010/main" val="3759599464"/>
+        <p14:creationId xmlns:p14="http://schemas.microsoft.com/office/powerpoint/2010/main" val="2201795452"/>
       </p:ext>
     </p:extLst>
   </p:cSld>
@@ -7009,10 +7663,10 @@
       </p:grpSpPr>
       <p:sp>
         <p:nvSpPr>
-          <p:cNvPr id="2" name="Title 1">
+          <p:cNvPr id="4" name="Title 3">
             <a:extLst>
               <a:ext uri="{FF2B5EF4-FFF2-40B4-BE49-F238E27FC236}">
-                <a16:creationId xmlns:a16="http://schemas.microsoft.com/office/drawing/2014/main" id="{459E2191-5532-10AD-63D5-7DD2D5335982}"/>
+                <a16:creationId xmlns:a16="http://schemas.microsoft.com/office/drawing/2014/main" id="{01DE7B17-85C1-4BBB-79AA-27C4C676BE26}"/>
               </a:ext>
             </a:extLst>
           </p:cNvPr>
@@ -7030,17 +7684,17 @@
           <a:p>
             <a:r>
               <a:rPr lang="en-US" dirty="0"/>
-              <a:t>Time</a:t>
-            </a:r>
-          </a:p>
-        </p:txBody>
-      </p:sp>
-      <p:sp>
-        <p:nvSpPr>
-          <p:cNvPr id="3" name="Content Placeholder 2">
+              <a:t>Questions?</a:t>
+            </a:r>
+          </a:p>
+        </p:txBody>
+      </p:sp>
+      <p:sp>
+        <p:nvSpPr>
+          <p:cNvPr id="5" name="Text Placeholder 4">
             <a:extLst>
               <a:ext uri="{FF2B5EF4-FFF2-40B4-BE49-F238E27FC236}">
-                <a16:creationId xmlns:a16="http://schemas.microsoft.com/office/drawing/2014/main" id="{AD8F1DF8-05A6-B268-896F-6516F7C8F6BE}"/>
+                <a16:creationId xmlns:a16="http://schemas.microsoft.com/office/drawing/2014/main" id="{EA848E0C-19D9-B712-E9E3-F97A2166B3E4}"/>
               </a:ext>
             </a:extLst>
           </p:cNvPr>
@@ -7048,99 +7702,22 @@
             <a:spLocks noGrp="1"/>
           </p:cNvSpPr>
           <p:nvPr>
-            <p:ph idx="1"/>
+            <p:ph type="body" idx="1"/>
           </p:nvPr>
         </p:nvSpPr>
         <p:spPr/>
         <p:txBody>
-          <a:bodyPr>
-            <a:normAutofit lnSpcReduction="10000"/>
-          </a:bodyPr>
-          <a:lstStyle/>
-          <a:p>
-            <a:r>
-              <a:rPr lang="en-US" dirty="0"/>
-              <a:t>Development:</a:t>
-            </a:r>
-          </a:p>
-          <a:p>
-            <a:pPr lvl="1"/>
-            <a:r>
-              <a:rPr lang="en-US" dirty="0"/>
-              <a:t>Application: </a:t>
-            </a:r>
-          </a:p>
-          <a:p>
-            <a:pPr lvl="2"/>
-            <a:r>
-              <a:rPr lang="en-US" dirty="0"/>
-              <a:t>Next.js has a small learning curve</a:t>
-            </a:r>
-          </a:p>
-          <a:p>
-            <a:pPr lvl="2"/>
-            <a:r>
-              <a:rPr lang="en-US" dirty="0"/>
-              <a:t>Tailwind CSS is easy to learn</a:t>
-            </a:r>
-          </a:p>
-          <a:p>
-            <a:pPr lvl="1"/>
-            <a:r>
-              <a:rPr lang="en-US" dirty="0"/>
-              <a:t>Infrastructure:</a:t>
-            </a:r>
-          </a:p>
-          <a:p>
-            <a:pPr lvl="2"/>
-            <a:r>
-              <a:rPr lang="en-US" dirty="0" err="1"/>
-              <a:t>IaC</a:t>
-            </a:r>
-            <a:r>
-              <a:rPr lang="en-US" dirty="0"/>
-              <a:t> (CloudFormation, Terraform)</a:t>
-            </a:r>
-          </a:p>
-          <a:p>
-            <a:r>
-              <a:rPr lang="en-US" dirty="0"/>
-              <a:t>Deployment:</a:t>
-            </a:r>
-          </a:p>
-          <a:p>
-            <a:pPr lvl="1"/>
-            <a:r>
-              <a:rPr lang="en-US" dirty="0"/>
-              <a:t>GitHub Action has small learning curve</a:t>
-            </a:r>
-          </a:p>
-          <a:p>
-            <a:r>
-              <a:rPr lang="en-US" dirty="0"/>
-              <a:t>Operational:</a:t>
-            </a:r>
-          </a:p>
-          <a:p>
-            <a:pPr lvl="1"/>
-            <a:r>
-              <a:rPr lang="en-US" dirty="0"/>
-              <a:t>CloudFront caching</a:t>
-            </a:r>
-          </a:p>
-          <a:p>
-            <a:pPr lvl="1"/>
-            <a:r>
-              <a:rPr lang="en-US" dirty="0"/>
-              <a:t>Static Files served by S3</a:t>
-            </a:r>
+          <a:bodyPr/>
+          <a:lstStyle/>
+          <a:p>
+            <a:endParaRPr lang="en-US"/>
           </a:p>
         </p:txBody>
       </p:sp>
     </p:spTree>
     <p:extLst>
       <p:ext uri="{BB962C8B-B14F-4D97-AF65-F5344CB8AC3E}">
-        <p14:creationId xmlns:p14="http://schemas.microsoft.com/office/powerpoint/2010/main" val="2201795452"/>
+        <p14:creationId xmlns:p14="http://schemas.microsoft.com/office/powerpoint/2010/main" val="4273965190"/>
       </p:ext>
     </p:extLst>
   </p:cSld>
@@ -7172,7 +7749,7 @@
           <p:cNvPr id="2" name="Title 1">
             <a:extLst>
               <a:ext uri="{FF2B5EF4-FFF2-40B4-BE49-F238E27FC236}">
-                <a16:creationId xmlns:a16="http://schemas.microsoft.com/office/drawing/2014/main" id="{D945F10E-853E-CFBA-437C-74F9EB9B3C1A}"/>
+                <a16:creationId xmlns:a16="http://schemas.microsoft.com/office/drawing/2014/main" id="{0776A220-F5A3-FBF4-D56D-DDC372C41F8E}"/>
               </a:ext>
             </a:extLst>
           </p:cNvPr>
@@ -7190,17 +7767,17 @@
           <a:p>
             <a:r>
               <a:rPr lang="en-US" dirty="0"/>
-              <a:t>Cost</a:t>
-            </a:r>
-          </a:p>
-        </p:txBody>
-      </p:sp>
-      <p:sp>
-        <p:nvSpPr>
-          <p:cNvPr id="3" name="Content Placeholder 2">
+              <a:t>Backup Slides</a:t>
+            </a:r>
+          </a:p>
+        </p:txBody>
+      </p:sp>
+      <p:sp>
+        <p:nvSpPr>
+          <p:cNvPr id="3" name="Text Placeholder 2">
             <a:extLst>
               <a:ext uri="{FF2B5EF4-FFF2-40B4-BE49-F238E27FC236}">
-                <a16:creationId xmlns:a16="http://schemas.microsoft.com/office/drawing/2014/main" id="{770135FC-86B9-D66B-5DC7-089369610D58}"/>
+                <a16:creationId xmlns:a16="http://schemas.microsoft.com/office/drawing/2014/main" id="{B8AD4061-DC68-FAF9-6654-F1FF033B6DCD}"/>
               </a:ext>
             </a:extLst>
           </p:cNvPr>
@@ -7208,589 +7785,22 @@
             <a:spLocks noGrp="1"/>
           </p:cNvSpPr>
           <p:nvPr>
-            <p:ph idx="1"/>
-          </p:nvPr>
-        </p:nvSpPr>
-        <p:spPr>
-          <a:xfrm>
-            <a:off x="838200" y="1825624"/>
-            <a:ext cx="5321680" cy="4351337"/>
-          </a:xfrm>
-        </p:spPr>
-        <p:txBody>
-          <a:bodyPr>
-            <a:normAutofit/>
-          </a:bodyPr>
-          <a:lstStyle/>
-          <a:p>
-            <a:r>
-              <a:rPr lang="en-US" dirty="0"/>
-              <a:t>CloudFront</a:t>
-            </a:r>
-          </a:p>
-          <a:p>
-            <a:pPr lvl="1"/>
-            <a:r>
-              <a:rPr lang="en-US" b="0" i="0" dirty="0">
-                <a:solidFill>
-                  <a:srgbClr val="333333"/>
-                </a:solidFill>
-                <a:effectLst/>
-                <a:latin typeface="AmazonEmber"/>
-              </a:rPr>
-              <a:t>Free tier:</a:t>
-            </a:r>
-          </a:p>
-          <a:p>
-            <a:pPr lvl="2"/>
-            <a:r>
-              <a:rPr lang="en-US" b="0" i="0" dirty="0">
-                <a:solidFill>
-                  <a:srgbClr val="333333"/>
-                </a:solidFill>
-                <a:effectLst/>
-                <a:latin typeface="AmazonEmber"/>
-              </a:rPr>
-              <a:t>1 TB of data transfer out to the internet per month</a:t>
-            </a:r>
-          </a:p>
-          <a:p>
-            <a:pPr lvl="2"/>
-            <a:r>
-              <a:rPr lang="en-US" b="0" i="0" dirty="0">
-                <a:solidFill>
-                  <a:srgbClr val="333333"/>
-                </a:solidFill>
-                <a:effectLst/>
-                <a:latin typeface="AmazonEmber"/>
-              </a:rPr>
-              <a:t>10,000,000 HTTP or HTTPS Requests per month</a:t>
-            </a:r>
-          </a:p>
-          <a:p>
-            <a:pPr lvl="1"/>
-            <a:r>
-              <a:rPr lang="en-US" b="0" i="0" dirty="0">
-                <a:solidFill>
-                  <a:srgbClr val="333333"/>
-                </a:solidFill>
-                <a:effectLst/>
-                <a:latin typeface="AmazonEmber"/>
-              </a:rPr>
-              <a:t>Paid tier:</a:t>
-            </a:r>
-          </a:p>
-          <a:p>
-            <a:pPr lvl="2"/>
-            <a:r>
-              <a:rPr lang="en-US" b="0" i="0" dirty="0">
-                <a:solidFill>
-                  <a:srgbClr val="333333"/>
-                </a:solidFill>
-                <a:effectLst/>
-                <a:latin typeface="AmazonEmber"/>
-              </a:rPr>
-              <a:t>First 10TB: $0.085</a:t>
-            </a:r>
-          </a:p>
-          <a:p>
-            <a:pPr lvl="2"/>
-            <a:r>
-              <a:rPr lang="en-US" dirty="0">
-                <a:solidFill>
-                  <a:srgbClr val="333333"/>
-                </a:solidFill>
-                <a:latin typeface="AmazonEmber"/>
-              </a:rPr>
-              <a:t>HTTP Requests: </a:t>
-            </a:r>
-            <a:r>
-              <a:rPr lang="en-US" b="0" i="0" dirty="0">
-                <a:solidFill>
-                  <a:srgbClr val="333333"/>
-                </a:solidFill>
-                <a:effectLst/>
-                <a:latin typeface="AmazonEmber"/>
-              </a:rPr>
-              <a:t>$0.0075</a:t>
-            </a:r>
-            <a:r>
-              <a:rPr lang="en-US" dirty="0">
-                <a:solidFill>
-                  <a:srgbClr val="333333"/>
-                </a:solidFill>
-                <a:latin typeface="AmazonEmber"/>
-              </a:rPr>
-              <a:t> per 10,000 requests</a:t>
-            </a:r>
-          </a:p>
-          <a:p>
-            <a:pPr lvl="2"/>
-            <a:r>
-              <a:rPr lang="en-US" b="0" i="0" dirty="0">
-                <a:solidFill>
-                  <a:srgbClr val="333333"/>
-                </a:solidFill>
-                <a:effectLst/>
-                <a:latin typeface="AmazonEmber"/>
-              </a:rPr>
-              <a:t>HTTPS Requests: $0.0100 per 10,000 requests</a:t>
-            </a:r>
-          </a:p>
-          <a:p>
-            <a:pPr>
-              <a:lnSpc>
-                <a:spcPct val="80000"/>
-              </a:lnSpc>
-            </a:pPr>
-            <a:r>
-              <a:rPr lang="en-US" dirty="0"/>
-              <a:t>ACM (SSL Certificate)</a:t>
-            </a:r>
-          </a:p>
-          <a:p>
-            <a:pPr lvl="2"/>
-            <a:r>
-              <a:rPr lang="en-US" sz="2100" dirty="0">
-                <a:solidFill>
-                  <a:srgbClr val="333333"/>
-                </a:solidFill>
-                <a:latin typeface="AmazonEmber"/>
-              </a:rPr>
-              <a:t>Public SSL/TLS certificates provisioned through AWS Certificate Manager (ACM) are free</a:t>
-            </a:r>
-          </a:p>
-          <a:p>
-            <a:endParaRPr lang="en-US" b="0" i="0" dirty="0">
-              <a:solidFill>
-                <a:srgbClr val="333333"/>
-              </a:solidFill>
-              <a:effectLst/>
-              <a:latin typeface="AmazonEmber"/>
-            </a:endParaRPr>
-          </a:p>
-          <a:p>
-            <a:pPr lvl="1"/>
-            <a:endParaRPr lang="en-US" dirty="0"/>
-          </a:p>
-          <a:p>
-            <a:endParaRPr lang="en-US" dirty="0"/>
-          </a:p>
-        </p:txBody>
-      </p:sp>
-      <p:sp>
-        <p:nvSpPr>
-          <p:cNvPr id="5" name="Content Placeholder 2">
-            <a:extLst>
-              <a:ext uri="{FF2B5EF4-FFF2-40B4-BE49-F238E27FC236}">
-                <a16:creationId xmlns:a16="http://schemas.microsoft.com/office/drawing/2014/main" id="{55301F2B-3D69-4CDE-236D-34E32CA2217C}"/>
-              </a:ext>
-            </a:extLst>
-          </p:cNvPr>
-          <p:cNvSpPr txBox="1">
-            <a:spLocks/>
-          </p:cNvSpPr>
-          <p:nvPr/>
-        </p:nvSpPr>
-        <p:spPr>
-          <a:xfrm>
-            <a:off x="6096000" y="1825625"/>
-            <a:ext cx="5321680" cy="4351336"/>
-          </a:xfrm>
-          <a:prstGeom prst="rect">
-            <a:avLst/>
-          </a:prstGeom>
-        </p:spPr>
-        <p:txBody>
-          <a:bodyPr vert="horz" lIns="91440" tIns="45720" rIns="91440" bIns="45720" rtlCol="0">
-            <a:normAutofit fontScale="92500" lnSpcReduction="20000"/>
-          </a:bodyPr>
-          <a:lstStyle>
-            <a:lvl1pPr marL="228600" indent="-228600" algn="l" defTabSz="914400" rtl="0" eaLnBrk="1" latinLnBrk="0" hangingPunct="1">
-              <a:lnSpc>
-                <a:spcPct val="90000"/>
-              </a:lnSpc>
-              <a:spcBef>
-                <a:spcPts val="1000"/>
-              </a:spcBef>
-              <a:buFont typeface="Arial" panose="020B0604020202020204" pitchFamily="34" charset="0"/>
-              <a:buChar char="•"/>
-              <a:defRPr sz="2800" kern="1200">
-                <a:solidFill>
-                  <a:schemeClr val="tx1"/>
-                </a:solidFill>
-                <a:latin typeface="+mn-lt"/>
-                <a:ea typeface="+mn-ea"/>
-                <a:cs typeface="+mn-cs"/>
-              </a:defRPr>
-            </a:lvl1pPr>
-            <a:lvl2pPr marL="685800" indent="-228600" algn="l" defTabSz="914400" rtl="0" eaLnBrk="1" latinLnBrk="0" hangingPunct="1">
-              <a:lnSpc>
-                <a:spcPct val="90000"/>
-              </a:lnSpc>
-              <a:spcBef>
-                <a:spcPts val="500"/>
-              </a:spcBef>
-              <a:buFont typeface="Arial" panose="020B0604020202020204" pitchFamily="34" charset="0"/>
-              <a:buChar char="•"/>
-              <a:defRPr sz="2400" kern="1200">
-                <a:solidFill>
-                  <a:schemeClr val="tx1"/>
-                </a:solidFill>
-                <a:latin typeface="+mn-lt"/>
-                <a:ea typeface="+mn-ea"/>
-                <a:cs typeface="+mn-cs"/>
-              </a:defRPr>
-            </a:lvl2pPr>
-            <a:lvl3pPr marL="1143000" indent="-228600" algn="l" defTabSz="914400" rtl="0" eaLnBrk="1" latinLnBrk="0" hangingPunct="1">
-              <a:lnSpc>
-                <a:spcPct val="90000"/>
-              </a:lnSpc>
-              <a:spcBef>
-                <a:spcPts val="500"/>
-              </a:spcBef>
-              <a:buFont typeface="Arial" panose="020B0604020202020204" pitchFamily="34" charset="0"/>
-              <a:buChar char="•"/>
-              <a:defRPr sz="2000" kern="1200">
-                <a:solidFill>
-                  <a:schemeClr val="tx1"/>
-                </a:solidFill>
-                <a:latin typeface="+mn-lt"/>
-                <a:ea typeface="+mn-ea"/>
-                <a:cs typeface="+mn-cs"/>
-              </a:defRPr>
-            </a:lvl3pPr>
-            <a:lvl4pPr marL="1600200" indent="-228600" algn="l" defTabSz="914400" rtl="0" eaLnBrk="1" latinLnBrk="0" hangingPunct="1">
-              <a:lnSpc>
-                <a:spcPct val="90000"/>
-              </a:lnSpc>
-              <a:spcBef>
-                <a:spcPts val="500"/>
-              </a:spcBef>
-              <a:buFont typeface="Arial" panose="020B0604020202020204" pitchFamily="34" charset="0"/>
-              <a:buChar char="•"/>
-              <a:defRPr sz="1800" kern="1200">
-                <a:solidFill>
-                  <a:schemeClr val="tx1"/>
-                </a:solidFill>
-                <a:latin typeface="+mn-lt"/>
-                <a:ea typeface="+mn-ea"/>
-                <a:cs typeface="+mn-cs"/>
-              </a:defRPr>
-            </a:lvl4pPr>
-            <a:lvl5pPr marL="2057400" indent="-228600" algn="l" defTabSz="914400" rtl="0" eaLnBrk="1" latinLnBrk="0" hangingPunct="1">
-              <a:lnSpc>
-                <a:spcPct val="90000"/>
-              </a:lnSpc>
-              <a:spcBef>
-                <a:spcPts val="500"/>
-              </a:spcBef>
-              <a:buFont typeface="Arial" panose="020B0604020202020204" pitchFamily="34" charset="0"/>
-              <a:buChar char="•"/>
-              <a:defRPr sz="1800" kern="1200">
-                <a:solidFill>
-                  <a:schemeClr val="tx1"/>
-                </a:solidFill>
-                <a:latin typeface="+mn-lt"/>
-                <a:ea typeface="+mn-ea"/>
-                <a:cs typeface="+mn-cs"/>
-              </a:defRPr>
-            </a:lvl5pPr>
-            <a:lvl6pPr marL="2514600" indent="-228600" algn="l" defTabSz="914400" rtl="0" eaLnBrk="1" latinLnBrk="0" hangingPunct="1">
-              <a:lnSpc>
-                <a:spcPct val="90000"/>
-              </a:lnSpc>
-              <a:spcBef>
-                <a:spcPts val="500"/>
-              </a:spcBef>
-              <a:buFont typeface="Arial" panose="020B0604020202020204" pitchFamily="34" charset="0"/>
-              <a:buChar char="•"/>
-              <a:defRPr sz="1800" kern="1200">
-                <a:solidFill>
-                  <a:schemeClr val="tx1"/>
-                </a:solidFill>
-                <a:latin typeface="+mn-lt"/>
-                <a:ea typeface="+mn-ea"/>
-                <a:cs typeface="+mn-cs"/>
-              </a:defRPr>
-            </a:lvl6pPr>
-            <a:lvl7pPr marL="2971800" indent="-228600" algn="l" defTabSz="914400" rtl="0" eaLnBrk="1" latinLnBrk="0" hangingPunct="1">
-              <a:lnSpc>
-                <a:spcPct val="90000"/>
-              </a:lnSpc>
-              <a:spcBef>
-                <a:spcPts val="500"/>
-              </a:spcBef>
-              <a:buFont typeface="Arial" panose="020B0604020202020204" pitchFamily="34" charset="0"/>
-              <a:buChar char="•"/>
-              <a:defRPr sz="1800" kern="1200">
-                <a:solidFill>
-                  <a:schemeClr val="tx1"/>
-                </a:solidFill>
-                <a:latin typeface="+mn-lt"/>
-                <a:ea typeface="+mn-ea"/>
-                <a:cs typeface="+mn-cs"/>
-              </a:defRPr>
-            </a:lvl7pPr>
-            <a:lvl8pPr marL="3429000" indent="-228600" algn="l" defTabSz="914400" rtl="0" eaLnBrk="1" latinLnBrk="0" hangingPunct="1">
-              <a:lnSpc>
-                <a:spcPct val="90000"/>
-              </a:lnSpc>
-              <a:spcBef>
-                <a:spcPts val="500"/>
-              </a:spcBef>
-              <a:buFont typeface="Arial" panose="020B0604020202020204" pitchFamily="34" charset="0"/>
-              <a:buChar char="•"/>
-              <a:defRPr sz="1800" kern="1200">
-                <a:solidFill>
-                  <a:schemeClr val="tx1"/>
-                </a:solidFill>
-                <a:latin typeface="+mn-lt"/>
-                <a:ea typeface="+mn-ea"/>
-                <a:cs typeface="+mn-cs"/>
-              </a:defRPr>
-            </a:lvl8pPr>
-            <a:lvl9pPr marL="3886200" indent="-228600" algn="l" defTabSz="914400" rtl="0" eaLnBrk="1" latinLnBrk="0" hangingPunct="1">
-              <a:lnSpc>
-                <a:spcPct val="90000"/>
-              </a:lnSpc>
-              <a:spcBef>
-                <a:spcPts val="500"/>
-              </a:spcBef>
-              <a:buFont typeface="Arial" panose="020B0604020202020204" pitchFamily="34" charset="0"/>
-              <a:buChar char="•"/>
-              <a:defRPr sz="1800" kern="1200">
-                <a:solidFill>
-                  <a:schemeClr val="tx1"/>
-                </a:solidFill>
-                <a:latin typeface="+mn-lt"/>
-                <a:ea typeface="+mn-ea"/>
-                <a:cs typeface="+mn-cs"/>
-              </a:defRPr>
-            </a:lvl9pPr>
-          </a:lstStyle>
-          <a:p>
-            <a:r>
-              <a:rPr lang="en-US" b="0" i="0" dirty="0">
-                <a:solidFill>
-                  <a:srgbClr val="333333"/>
-                </a:solidFill>
-                <a:effectLst/>
-                <a:latin typeface="AmazonEmber"/>
-              </a:rPr>
-              <a:t>S3</a:t>
-            </a:r>
-          </a:p>
-          <a:p>
-            <a:pPr lvl="1"/>
-            <a:r>
-              <a:rPr lang="en-US" dirty="0">
-                <a:solidFill>
-                  <a:srgbClr val="333333"/>
-                </a:solidFill>
-                <a:latin typeface="AmazonEmber"/>
-              </a:rPr>
-              <a:t>Free tier:</a:t>
-            </a:r>
-          </a:p>
-          <a:p>
-            <a:pPr lvl="2"/>
-            <a:r>
-              <a:rPr lang="en-US" b="0" i="0" dirty="0">
-                <a:solidFill>
-                  <a:srgbClr val="333333"/>
-                </a:solidFill>
-                <a:effectLst/>
-                <a:latin typeface="AmazonEmber"/>
-              </a:rPr>
-              <a:t>20,000 GET Requests</a:t>
-            </a:r>
-          </a:p>
-          <a:p>
-            <a:pPr lvl="2"/>
-            <a:r>
-              <a:rPr lang="en-US" b="0" i="0" dirty="0">
-                <a:solidFill>
-                  <a:srgbClr val="333333"/>
-                </a:solidFill>
-                <a:effectLst/>
-                <a:latin typeface="AmazonEmber"/>
-              </a:rPr>
-              <a:t>2,000 PUT, COPY, POST, or LIST Requests</a:t>
-            </a:r>
-          </a:p>
-          <a:p>
-            <a:pPr lvl="2"/>
-            <a:r>
-              <a:rPr lang="en-US" b="0" i="0" dirty="0">
-                <a:solidFill>
-                  <a:srgbClr val="333333"/>
-                </a:solidFill>
-                <a:effectLst/>
-                <a:latin typeface="AmazonEmber"/>
-              </a:rPr>
-              <a:t>100 GB of Data Transfer Out each month</a:t>
-            </a:r>
-            <a:endParaRPr lang="en-US" dirty="0">
-              <a:solidFill>
-                <a:srgbClr val="333333"/>
-              </a:solidFill>
-              <a:latin typeface="AmazonEmber"/>
-            </a:endParaRPr>
-          </a:p>
-          <a:p>
-            <a:pPr lvl="1"/>
-            <a:r>
-              <a:rPr lang="en-US" b="0" i="0" dirty="0">
-                <a:solidFill>
-                  <a:srgbClr val="333333"/>
-                </a:solidFill>
-                <a:effectLst/>
-                <a:latin typeface="AmazonEmber"/>
-              </a:rPr>
-              <a:t>Storage: </a:t>
-            </a:r>
-          </a:p>
-          <a:p>
-            <a:pPr lvl="2"/>
-            <a:r>
-              <a:rPr lang="en-US" b="0" i="0" dirty="0">
-                <a:solidFill>
-                  <a:srgbClr val="333333"/>
-                </a:solidFill>
-                <a:effectLst/>
-                <a:latin typeface="AmazonEmber"/>
-              </a:rPr>
-              <a:t>First 50 TB / Month: $0.023 per GB</a:t>
-            </a:r>
-          </a:p>
-          <a:p>
-            <a:pPr lvl="1"/>
-            <a:r>
-              <a:rPr lang="en-US" b="0" i="0" dirty="0">
-                <a:solidFill>
-                  <a:srgbClr val="333333"/>
-                </a:solidFill>
-                <a:effectLst/>
-                <a:latin typeface="AmazonEmber"/>
-              </a:rPr>
-              <a:t>Requests:</a:t>
-            </a:r>
-          </a:p>
-          <a:p>
-            <a:pPr lvl="2"/>
-            <a:r>
-              <a:rPr lang="en-US" b="0" i="0" dirty="0">
-                <a:solidFill>
-                  <a:srgbClr val="333333"/>
-                </a:solidFill>
-                <a:effectLst/>
-                <a:latin typeface="AmazonEmberBold"/>
-              </a:rPr>
-              <a:t>S3 Standard: </a:t>
-            </a:r>
-            <a:r>
-              <a:rPr lang="en-US" b="0" i="0" dirty="0">
-                <a:solidFill>
-                  <a:srgbClr val="333333"/>
-                </a:solidFill>
-                <a:effectLst/>
-                <a:latin typeface="AmazonEmber"/>
-              </a:rPr>
-              <a:t>$0.0004 per 1,000 GET requests</a:t>
-            </a:r>
-          </a:p>
-          <a:p>
-            <a:pPr lvl="1"/>
-            <a:r>
-              <a:rPr lang="en-US" b="0" i="0" dirty="0">
-                <a:solidFill>
-                  <a:srgbClr val="333333"/>
-                </a:solidFill>
-                <a:effectLst/>
-                <a:latin typeface="AmazonEmber"/>
-              </a:rPr>
-              <a:t>Data transfer:</a:t>
-            </a:r>
-          </a:p>
-          <a:p>
-            <a:pPr lvl="2"/>
-            <a:r>
-              <a:rPr lang="en-US" b="0" i="0" dirty="0">
-                <a:solidFill>
-                  <a:srgbClr val="333333"/>
-                </a:solidFill>
-                <a:effectLst/>
-                <a:latin typeface="AmazonEmber"/>
-              </a:rPr>
-              <a:t>First 10 TB / Month</a:t>
-            </a:r>
-            <a:r>
-              <a:rPr lang="en-US" dirty="0">
-                <a:solidFill>
-                  <a:srgbClr val="333333"/>
-                </a:solidFill>
-                <a:latin typeface="AmazonEmber"/>
-              </a:rPr>
-              <a:t>: </a:t>
-            </a:r>
-            <a:r>
-              <a:rPr lang="en-US" b="0" i="0" dirty="0">
-                <a:solidFill>
-                  <a:srgbClr val="333333"/>
-                </a:solidFill>
-                <a:effectLst/>
-                <a:latin typeface="AmazonEmber"/>
-              </a:rPr>
-              <a:t>$0.09 per GB</a:t>
-            </a:r>
-            <a:endParaRPr lang="en-US" sz="2000" dirty="0"/>
-          </a:p>
-          <a:p>
-            <a:pPr>
-              <a:lnSpc>
-                <a:spcPct val="70000"/>
-              </a:lnSpc>
-            </a:pPr>
-            <a:r>
-              <a:rPr lang="en-US" dirty="0">
-                <a:solidFill>
-                  <a:srgbClr val="333333"/>
-                </a:solidFill>
-                <a:latin typeface="AmazonEmber"/>
-              </a:rPr>
-              <a:t>Public Hosted Zone (optional)</a:t>
-            </a:r>
-          </a:p>
-          <a:p>
-            <a:pPr lvl="2"/>
-            <a:r>
-              <a:rPr lang="en-US" sz="2100" dirty="0">
-                <a:solidFill>
-                  <a:srgbClr val="333333"/>
-                </a:solidFill>
-                <a:latin typeface="AmazonEmberBold"/>
-              </a:rPr>
-              <a:t>$0.50 per hosted zone per month for the first 25 hosted zones</a:t>
-            </a:r>
-          </a:p>
-          <a:p>
-            <a:pPr>
-              <a:lnSpc>
-                <a:spcPct val="70000"/>
-              </a:lnSpc>
-            </a:pPr>
-            <a:endParaRPr lang="en-US" sz="2000" dirty="0"/>
-          </a:p>
-          <a:p>
-            <a:endParaRPr lang="en-US" dirty="0"/>
+            <p:ph type="body" idx="1"/>
+          </p:nvPr>
+        </p:nvSpPr>
+        <p:spPr/>
+        <p:txBody>
+          <a:bodyPr/>
+          <a:lstStyle/>
+          <a:p>
+            <a:endParaRPr lang="en-US"/>
           </a:p>
         </p:txBody>
       </p:sp>
     </p:spTree>
     <p:extLst>
       <p:ext uri="{BB962C8B-B14F-4D97-AF65-F5344CB8AC3E}">
-        <p14:creationId xmlns:p14="http://schemas.microsoft.com/office/powerpoint/2010/main" val="4226920793"/>
+        <p14:creationId xmlns:p14="http://schemas.microsoft.com/office/powerpoint/2010/main" val="2615662091"/>
       </p:ext>
     </p:extLst>
   </p:cSld>
@@ -7819,10 +7829,10 @@
       </p:grpSpPr>
       <p:sp>
         <p:nvSpPr>
-          <p:cNvPr id="4" name="Title 3">
+          <p:cNvPr id="2" name="Title 1">
             <a:extLst>
               <a:ext uri="{FF2B5EF4-FFF2-40B4-BE49-F238E27FC236}">
-                <a16:creationId xmlns:a16="http://schemas.microsoft.com/office/drawing/2014/main" id="{01DE7B17-85C1-4BBB-79AA-27C4C676BE26}"/>
+                <a16:creationId xmlns:a16="http://schemas.microsoft.com/office/drawing/2014/main" id="{A60DB5D8-CE77-728C-CE2B-E19F2D092B1C}"/>
               </a:ext>
             </a:extLst>
           </p:cNvPr>
@@ -7840,17 +7850,17 @@
           <a:p>
             <a:r>
               <a:rPr lang="en-US" dirty="0"/>
-              <a:t>Questions?</a:t>
-            </a:r>
-          </a:p>
-        </p:txBody>
-      </p:sp>
-      <p:sp>
-        <p:nvSpPr>
-          <p:cNvPr id="5" name="Text Placeholder 4">
+              <a:t>Domain</a:t>
+            </a:r>
+          </a:p>
+        </p:txBody>
+      </p:sp>
+      <p:sp>
+        <p:nvSpPr>
+          <p:cNvPr id="3" name="Content Placeholder 2">
             <a:extLst>
               <a:ext uri="{FF2B5EF4-FFF2-40B4-BE49-F238E27FC236}">
-                <a16:creationId xmlns:a16="http://schemas.microsoft.com/office/drawing/2014/main" id="{EA848E0C-19D9-B712-E9E3-F97A2166B3E4}"/>
+                <a16:creationId xmlns:a16="http://schemas.microsoft.com/office/drawing/2014/main" id="{A0CE8C8B-36C9-C096-1664-3C50F7E7150E}"/>
               </a:ext>
             </a:extLst>
           </p:cNvPr>
@@ -7858,7 +7868,7 @@
             <a:spLocks noGrp="1"/>
           </p:cNvSpPr>
           <p:nvPr>
-            <p:ph type="body" idx="1"/>
+            <p:ph idx="1"/>
           </p:nvPr>
         </p:nvSpPr>
         <p:spPr/>
@@ -7866,14 +7876,60 @@
           <a:bodyPr/>
           <a:lstStyle/>
           <a:p>
-            <a:endParaRPr lang="en-US"/>
+            <a:r>
+              <a:rPr lang="en-US" dirty="0" err="1"/>
+              <a:t>CloudFlare</a:t>
+            </a:r>
+            <a:endParaRPr lang="en-US" dirty="0"/>
+          </a:p>
+          <a:p>
+            <a:pPr lvl="1"/>
+            <a:r>
+              <a:rPr lang="en-US" dirty="0"/>
+              <a:t>Pros:</a:t>
+            </a:r>
+          </a:p>
+          <a:p>
+            <a:pPr lvl="2"/>
+            <a:r>
+              <a:rPr lang="en-US" dirty="0"/>
+              <a:t>No extra charge</a:t>
+            </a:r>
+          </a:p>
+          <a:p>
+            <a:pPr lvl="1"/>
+            <a:r>
+              <a:rPr lang="en-US" dirty="0"/>
+              <a:t>Cons:</a:t>
+            </a:r>
+          </a:p>
+          <a:p>
+            <a:pPr lvl="2"/>
+            <a:r>
+              <a:rPr lang="en-US" dirty="0"/>
+              <a:t>Have to use their DNS</a:t>
+            </a:r>
+          </a:p>
+          <a:p>
+            <a:pPr lvl="3"/>
+            <a:r>
+              <a:rPr lang="en-US" dirty="0"/>
+              <a:t>Only need Route 53 for SSL cert validation which is one time setup.</a:t>
+            </a:r>
+          </a:p>
+          <a:p>
+            <a:pPr lvl="3"/>
+            <a:r>
+              <a:rPr lang="en-US" dirty="0"/>
+              <a:t>Save $0.50 a month.</a:t>
+            </a:r>
           </a:p>
         </p:txBody>
       </p:sp>
     </p:spTree>
     <p:extLst>
       <p:ext uri="{BB962C8B-B14F-4D97-AF65-F5344CB8AC3E}">
-        <p14:creationId xmlns:p14="http://schemas.microsoft.com/office/powerpoint/2010/main" val="4273965190"/>
+        <p14:creationId xmlns:p14="http://schemas.microsoft.com/office/powerpoint/2010/main" val="1191592447"/>
       </p:ext>
     </p:extLst>
   </p:cSld>

</xml_diff>